<commit_message>
Added information to last few slides
Please note that some of the information for the last few slides are in the 'notes' part of the presentation. Open it to read them fully.
</commit_message>
<xml_diff>
--- a/ava presentation.pptx
+++ b/ava presentation.pptx
@@ -4,6 +4,9 @@
   <p:sldMasterIdLst>
     <p:sldMasterId id="2147483648" r:id="rId1"/>
   </p:sldMasterIdLst>
+  <p:notesMasterIdLst>
+    <p:notesMasterId r:id="rId18"/>
+  </p:notesMasterIdLst>
   <p:sldIdLst>
     <p:sldId id="256" r:id="rId2"/>
     <p:sldId id="268" r:id="rId3"/>
@@ -127,6 +130,614 @@
 </p:presentation>
 </file>
 
+<file path=ppt/notesMasters/notesMaster1.xml><?xml version="1.0" encoding="utf-8"?>
+<p:notesMaster xmlns:a="http://schemas.openxmlformats.org/drawingml/2006/main" xmlns:r="http://schemas.openxmlformats.org/officeDocument/2006/relationships" xmlns:p="http://schemas.openxmlformats.org/presentationml/2006/main">
+  <p:cSld>
+    <p:bg>
+      <p:bgRef idx="1001">
+        <a:schemeClr val="bg1"/>
+      </p:bgRef>
+    </p:bg>
+    <p:spTree>
+      <p:nvGrpSpPr>
+        <p:cNvPr id="1" name=""/>
+        <p:cNvGrpSpPr/>
+        <p:nvPr/>
+      </p:nvGrpSpPr>
+      <p:grpSpPr>
+        <a:xfrm>
+          <a:off x="0" y="0"/>
+          <a:ext cx="0" cy="0"/>
+          <a:chOff x="0" y="0"/>
+          <a:chExt cx="0" cy="0"/>
+        </a:xfrm>
+      </p:grpSpPr>
+      <p:sp>
+        <p:nvSpPr>
+          <p:cNvPr id="2" name="Header Placeholder 1"/>
+          <p:cNvSpPr>
+            <a:spLocks noGrp="1"/>
+          </p:cNvSpPr>
+          <p:nvPr>
+            <p:ph type="hdr" sz="quarter"/>
+          </p:nvPr>
+        </p:nvSpPr>
+        <p:spPr>
+          <a:xfrm>
+            <a:off x="0" y="0"/>
+            <a:ext cx="2971800" cy="458788"/>
+          </a:xfrm>
+          <a:prstGeom prst="rect">
+            <a:avLst/>
+          </a:prstGeom>
+        </p:spPr>
+        <p:txBody>
+          <a:bodyPr vert="horz" lIns="91440" tIns="45720" rIns="91440" bIns="45720" rtlCol="0"/>
+          <a:lstStyle>
+            <a:lvl1pPr algn="l">
+              <a:defRPr sz="1200"/>
+            </a:lvl1pPr>
+          </a:lstStyle>
+          <a:p>
+            <a:endParaRPr lang="en-US"/>
+          </a:p>
+        </p:txBody>
+      </p:sp>
+      <p:sp>
+        <p:nvSpPr>
+          <p:cNvPr id="3" name="Date Placeholder 2"/>
+          <p:cNvSpPr>
+            <a:spLocks noGrp="1"/>
+          </p:cNvSpPr>
+          <p:nvPr>
+            <p:ph type="dt" idx="1"/>
+          </p:nvPr>
+        </p:nvSpPr>
+        <p:spPr>
+          <a:xfrm>
+            <a:off x="3884613" y="0"/>
+            <a:ext cx="2971800" cy="458788"/>
+          </a:xfrm>
+          <a:prstGeom prst="rect">
+            <a:avLst/>
+          </a:prstGeom>
+        </p:spPr>
+        <p:txBody>
+          <a:bodyPr vert="horz" lIns="91440" tIns="45720" rIns="91440" bIns="45720" rtlCol="0"/>
+          <a:lstStyle>
+            <a:lvl1pPr algn="r">
+              <a:defRPr sz="1200"/>
+            </a:lvl1pPr>
+          </a:lstStyle>
+          <a:p>
+            <a:fld id="{87602F93-AEA4-41A8-922A-12BC3CDA1726}" type="datetimeFigureOut">
+              <a:rPr lang="en-US" smtClean="0"/>
+              <a:t>3/21/2018</a:t>
+            </a:fld>
+            <a:endParaRPr lang="en-US"/>
+          </a:p>
+        </p:txBody>
+      </p:sp>
+      <p:sp>
+        <p:nvSpPr>
+          <p:cNvPr id="4" name="Slide Image Placeholder 3"/>
+          <p:cNvSpPr>
+            <a:spLocks noGrp="1" noRot="1" noChangeAspect="1"/>
+          </p:cNvSpPr>
+          <p:nvPr>
+            <p:ph type="sldImg" idx="2"/>
+          </p:nvPr>
+        </p:nvSpPr>
+        <p:spPr>
+          <a:xfrm>
+            <a:off x="685800" y="1143000"/>
+            <a:ext cx="5486400" cy="3086100"/>
+          </a:xfrm>
+          <a:prstGeom prst="rect">
+            <a:avLst/>
+          </a:prstGeom>
+          <a:noFill/>
+          <a:ln w="12700">
+            <a:solidFill>
+              <a:prstClr val="black"/>
+            </a:solidFill>
+          </a:ln>
+        </p:spPr>
+        <p:txBody>
+          <a:bodyPr vert="horz" lIns="91440" tIns="45720" rIns="91440" bIns="45720" rtlCol="0" anchor="ctr"/>
+          <a:lstStyle/>
+          <a:p>
+            <a:endParaRPr lang="en-US"/>
+          </a:p>
+        </p:txBody>
+      </p:sp>
+      <p:sp>
+        <p:nvSpPr>
+          <p:cNvPr id="5" name="Notes Placeholder 4"/>
+          <p:cNvSpPr>
+            <a:spLocks noGrp="1"/>
+          </p:cNvSpPr>
+          <p:nvPr>
+            <p:ph type="body" sz="quarter" idx="3"/>
+          </p:nvPr>
+        </p:nvSpPr>
+        <p:spPr>
+          <a:xfrm>
+            <a:off x="685800" y="4400550"/>
+            <a:ext cx="5486400" cy="3600450"/>
+          </a:xfrm>
+          <a:prstGeom prst="rect">
+            <a:avLst/>
+          </a:prstGeom>
+        </p:spPr>
+        <p:txBody>
+          <a:bodyPr vert="horz" lIns="91440" tIns="45720" rIns="91440" bIns="45720" rtlCol="0"/>
+          <a:lstStyle/>
+          <a:p>
+            <a:pPr lvl="0"/>
+            <a:r>
+              <a:rPr lang="en-US" smtClean="0"/>
+              <a:t>Click to edit Master text styles</a:t>
+            </a:r>
+          </a:p>
+          <a:p>
+            <a:pPr lvl="1"/>
+            <a:r>
+              <a:rPr lang="en-US" smtClean="0"/>
+              <a:t>Second level</a:t>
+            </a:r>
+          </a:p>
+          <a:p>
+            <a:pPr lvl="2"/>
+            <a:r>
+              <a:rPr lang="en-US" smtClean="0"/>
+              <a:t>Third level</a:t>
+            </a:r>
+          </a:p>
+          <a:p>
+            <a:pPr lvl="3"/>
+            <a:r>
+              <a:rPr lang="en-US" smtClean="0"/>
+              <a:t>Fourth level</a:t>
+            </a:r>
+          </a:p>
+          <a:p>
+            <a:pPr lvl="4"/>
+            <a:r>
+              <a:rPr lang="en-US" smtClean="0"/>
+              <a:t>Fifth level</a:t>
+            </a:r>
+            <a:endParaRPr lang="en-US"/>
+          </a:p>
+        </p:txBody>
+      </p:sp>
+      <p:sp>
+        <p:nvSpPr>
+          <p:cNvPr id="6" name="Footer Placeholder 5"/>
+          <p:cNvSpPr>
+            <a:spLocks noGrp="1"/>
+          </p:cNvSpPr>
+          <p:nvPr>
+            <p:ph type="ftr" sz="quarter" idx="4"/>
+          </p:nvPr>
+        </p:nvSpPr>
+        <p:spPr>
+          <a:xfrm>
+            <a:off x="0" y="8685213"/>
+            <a:ext cx="2971800" cy="458787"/>
+          </a:xfrm>
+          <a:prstGeom prst="rect">
+            <a:avLst/>
+          </a:prstGeom>
+        </p:spPr>
+        <p:txBody>
+          <a:bodyPr vert="horz" lIns="91440" tIns="45720" rIns="91440" bIns="45720" rtlCol="0" anchor="b"/>
+          <a:lstStyle>
+            <a:lvl1pPr algn="l">
+              <a:defRPr sz="1200"/>
+            </a:lvl1pPr>
+          </a:lstStyle>
+          <a:p>
+            <a:endParaRPr lang="en-US"/>
+          </a:p>
+        </p:txBody>
+      </p:sp>
+      <p:sp>
+        <p:nvSpPr>
+          <p:cNvPr id="7" name="Slide Number Placeholder 6"/>
+          <p:cNvSpPr>
+            <a:spLocks noGrp="1"/>
+          </p:cNvSpPr>
+          <p:nvPr>
+            <p:ph type="sldNum" sz="quarter" idx="5"/>
+          </p:nvPr>
+        </p:nvSpPr>
+        <p:spPr>
+          <a:xfrm>
+            <a:off x="3884613" y="8685213"/>
+            <a:ext cx="2971800" cy="458787"/>
+          </a:xfrm>
+          <a:prstGeom prst="rect">
+            <a:avLst/>
+          </a:prstGeom>
+        </p:spPr>
+        <p:txBody>
+          <a:bodyPr vert="horz" lIns="91440" tIns="45720" rIns="91440" bIns="45720" rtlCol="0" anchor="b"/>
+          <a:lstStyle>
+            <a:lvl1pPr algn="r">
+              <a:defRPr sz="1200"/>
+            </a:lvl1pPr>
+          </a:lstStyle>
+          <a:p>
+            <a:fld id="{7221A80F-FD1A-4A18-9546-7A6E6A08D3E9}" type="slidenum">
+              <a:rPr lang="en-US" smtClean="0"/>
+              <a:t>‹#›</a:t>
+            </a:fld>
+            <a:endParaRPr lang="en-US"/>
+          </a:p>
+        </p:txBody>
+      </p:sp>
+    </p:spTree>
+    <p:extLst>
+      <p:ext uri="{BB962C8B-B14F-4D97-AF65-F5344CB8AC3E}">
+        <p14:creationId xmlns:p14="http://schemas.microsoft.com/office/powerpoint/2010/main" val="1917343650"/>
+      </p:ext>
+    </p:extLst>
+  </p:cSld>
+  <p:clrMap bg1="lt1" tx1="dk1" bg2="lt2" tx2="dk2" accent1="accent1" accent2="accent2" accent3="accent3" accent4="accent4" accent5="accent5" accent6="accent6" hlink="hlink" folHlink="folHlink"/>
+  <p:notesStyle>
+    <a:lvl1pPr marL="0" algn="l" defTabSz="914400" rtl="0" eaLnBrk="1" latinLnBrk="0" hangingPunct="1">
+      <a:defRPr sz="1200" kern="1200">
+        <a:solidFill>
+          <a:schemeClr val="tx1"/>
+        </a:solidFill>
+        <a:latin typeface="+mn-lt"/>
+        <a:ea typeface="+mn-ea"/>
+        <a:cs typeface="+mn-cs"/>
+      </a:defRPr>
+    </a:lvl1pPr>
+    <a:lvl2pPr marL="457200" algn="l" defTabSz="914400" rtl="0" eaLnBrk="1" latinLnBrk="0" hangingPunct="1">
+      <a:defRPr sz="1200" kern="1200">
+        <a:solidFill>
+          <a:schemeClr val="tx1"/>
+        </a:solidFill>
+        <a:latin typeface="+mn-lt"/>
+        <a:ea typeface="+mn-ea"/>
+        <a:cs typeface="+mn-cs"/>
+      </a:defRPr>
+    </a:lvl2pPr>
+    <a:lvl3pPr marL="914400" algn="l" defTabSz="914400" rtl="0" eaLnBrk="1" latinLnBrk="0" hangingPunct="1">
+      <a:defRPr sz="1200" kern="1200">
+        <a:solidFill>
+          <a:schemeClr val="tx1"/>
+        </a:solidFill>
+        <a:latin typeface="+mn-lt"/>
+        <a:ea typeface="+mn-ea"/>
+        <a:cs typeface="+mn-cs"/>
+      </a:defRPr>
+    </a:lvl3pPr>
+    <a:lvl4pPr marL="1371600" algn="l" defTabSz="914400" rtl="0" eaLnBrk="1" latinLnBrk="0" hangingPunct="1">
+      <a:defRPr sz="1200" kern="1200">
+        <a:solidFill>
+          <a:schemeClr val="tx1"/>
+        </a:solidFill>
+        <a:latin typeface="+mn-lt"/>
+        <a:ea typeface="+mn-ea"/>
+        <a:cs typeface="+mn-cs"/>
+      </a:defRPr>
+    </a:lvl4pPr>
+    <a:lvl5pPr marL="1828800" algn="l" defTabSz="914400" rtl="0" eaLnBrk="1" latinLnBrk="0" hangingPunct="1">
+      <a:defRPr sz="1200" kern="1200">
+        <a:solidFill>
+          <a:schemeClr val="tx1"/>
+        </a:solidFill>
+        <a:latin typeface="+mn-lt"/>
+        <a:ea typeface="+mn-ea"/>
+        <a:cs typeface="+mn-cs"/>
+      </a:defRPr>
+    </a:lvl5pPr>
+    <a:lvl6pPr marL="2286000" algn="l" defTabSz="914400" rtl="0" eaLnBrk="1" latinLnBrk="0" hangingPunct="1">
+      <a:defRPr sz="1200" kern="1200">
+        <a:solidFill>
+          <a:schemeClr val="tx1"/>
+        </a:solidFill>
+        <a:latin typeface="+mn-lt"/>
+        <a:ea typeface="+mn-ea"/>
+        <a:cs typeface="+mn-cs"/>
+      </a:defRPr>
+    </a:lvl6pPr>
+    <a:lvl7pPr marL="2743200" algn="l" defTabSz="914400" rtl="0" eaLnBrk="1" latinLnBrk="0" hangingPunct="1">
+      <a:defRPr sz="1200" kern="1200">
+        <a:solidFill>
+          <a:schemeClr val="tx1"/>
+        </a:solidFill>
+        <a:latin typeface="+mn-lt"/>
+        <a:ea typeface="+mn-ea"/>
+        <a:cs typeface="+mn-cs"/>
+      </a:defRPr>
+    </a:lvl7pPr>
+    <a:lvl8pPr marL="3200400" algn="l" defTabSz="914400" rtl="0" eaLnBrk="1" latinLnBrk="0" hangingPunct="1">
+      <a:defRPr sz="1200" kern="1200">
+        <a:solidFill>
+          <a:schemeClr val="tx1"/>
+        </a:solidFill>
+        <a:latin typeface="+mn-lt"/>
+        <a:ea typeface="+mn-ea"/>
+        <a:cs typeface="+mn-cs"/>
+      </a:defRPr>
+    </a:lvl8pPr>
+    <a:lvl9pPr marL="3657600" algn="l" defTabSz="914400" rtl="0" eaLnBrk="1" latinLnBrk="0" hangingPunct="1">
+      <a:defRPr sz="1200" kern="1200">
+        <a:solidFill>
+          <a:schemeClr val="tx1"/>
+        </a:solidFill>
+        <a:latin typeface="+mn-lt"/>
+        <a:ea typeface="+mn-ea"/>
+        <a:cs typeface="+mn-cs"/>
+      </a:defRPr>
+    </a:lvl9pPr>
+  </p:notesStyle>
+</p:notesMaster>
+</file>
+
+<file path=ppt/notesSlides/notesSlide1.xml><?xml version="1.0" encoding="utf-8"?>
+<p:notes xmlns:a="http://schemas.openxmlformats.org/drawingml/2006/main" xmlns:r="http://schemas.openxmlformats.org/officeDocument/2006/relationships" xmlns:p="http://schemas.openxmlformats.org/presentationml/2006/main">
+  <p:cSld>
+    <p:spTree>
+      <p:nvGrpSpPr>
+        <p:cNvPr id="1" name=""/>
+        <p:cNvGrpSpPr/>
+        <p:nvPr/>
+      </p:nvGrpSpPr>
+      <p:grpSpPr>
+        <a:xfrm>
+          <a:off x="0" y="0"/>
+          <a:ext cx="0" cy="0"/>
+          <a:chOff x="0" y="0"/>
+          <a:chExt cx="0" cy="0"/>
+        </a:xfrm>
+      </p:grpSpPr>
+      <p:sp>
+        <p:nvSpPr>
+          <p:cNvPr id="2" name="Slide Image Placeholder 1"/>
+          <p:cNvSpPr>
+            <a:spLocks noGrp="1" noRot="1" noChangeAspect="1"/>
+          </p:cNvSpPr>
+          <p:nvPr>
+            <p:ph type="sldImg"/>
+          </p:nvPr>
+        </p:nvSpPr>
+        <p:spPr/>
+      </p:sp>
+      <p:sp>
+        <p:nvSpPr>
+          <p:cNvPr id="3" name="Notes Placeholder 2"/>
+          <p:cNvSpPr>
+            <a:spLocks noGrp="1"/>
+          </p:cNvSpPr>
+          <p:nvPr>
+            <p:ph type="body" idx="1"/>
+          </p:nvPr>
+        </p:nvSpPr>
+        <p:spPr/>
+        <p:txBody>
+          <a:bodyPr/>
+          <a:lstStyle/>
+          <a:p>
+            <a:r>
+              <a:rPr lang="en-US" dirty="0" smtClean="0"/>
+              <a:t>Resources – 	C++ idea</a:t>
+            </a:r>
+            <a:r>
+              <a:rPr lang="en-US" baseline="0" dirty="0" smtClean="0"/>
+              <a:t> had to be scraped. If appropriate amounts of support material was available not only would the language choice of our program be different, but new C++ 	based programmers can experiment in making their own </a:t>
+            </a:r>
+            <a:r>
+              <a:rPr lang="en-US" baseline="0" dirty="0" err="1" smtClean="0"/>
+              <a:t>Chatbot</a:t>
+            </a:r>
+            <a:r>
+              <a:rPr lang="en-US" baseline="0" dirty="0" smtClean="0"/>
+              <a:t>.</a:t>
+            </a:r>
+          </a:p>
+          <a:p>
+            <a:r>
+              <a:rPr lang="en-US" baseline="0" dirty="0" smtClean="0"/>
+              <a:t>Priorities - 	Due to the fact that the main function of our project was quite challenging numerous minor details (e.g. dealing with resizing of HTML page and UI of the program on 	other devices such as mobile phones) were not perfected as much as we liked. </a:t>
+            </a:r>
+          </a:p>
+          <a:p>
+            <a:r>
+              <a:rPr lang="en-US" baseline="0" dirty="0" smtClean="0"/>
+              <a:t>Adaptation - 	While the program itself was a new test for all of us, it was not the only difficulty we faced. Probably the most detrimental one was having to adapt to each other – being 	able to effectively communicate with one-another and compromising where needed, the product is a reflection of the journey we have been through as a team.</a:t>
+            </a:r>
+          </a:p>
+          <a:p>
+            <a:endParaRPr lang="en-US" baseline="0" dirty="0" smtClean="0"/>
+          </a:p>
+          <a:p>
+            <a:endParaRPr lang="en-US" baseline="0" dirty="0" smtClean="0"/>
+          </a:p>
+          <a:p>
+            <a:r>
+              <a:rPr lang="en-US" baseline="0" dirty="0" smtClean="0"/>
+              <a:t>	</a:t>
+            </a:r>
+            <a:endParaRPr lang="en-US" dirty="0"/>
+          </a:p>
+        </p:txBody>
+      </p:sp>
+      <p:sp>
+        <p:nvSpPr>
+          <p:cNvPr id="4" name="Slide Number Placeholder 3"/>
+          <p:cNvSpPr>
+            <a:spLocks noGrp="1"/>
+          </p:cNvSpPr>
+          <p:nvPr>
+            <p:ph type="sldNum" sz="quarter" idx="10"/>
+          </p:nvPr>
+        </p:nvSpPr>
+        <p:spPr/>
+        <p:txBody>
+          <a:bodyPr/>
+          <a:lstStyle/>
+          <a:p>
+            <a:fld id="{7221A80F-FD1A-4A18-9546-7A6E6A08D3E9}" type="slidenum">
+              <a:rPr lang="en-US" smtClean="0"/>
+              <a:t>12</a:t>
+            </a:fld>
+            <a:endParaRPr lang="en-US"/>
+          </a:p>
+        </p:txBody>
+      </p:sp>
+    </p:spTree>
+    <p:extLst>
+      <p:ext uri="{BB962C8B-B14F-4D97-AF65-F5344CB8AC3E}">
+        <p14:creationId xmlns:p14="http://schemas.microsoft.com/office/powerpoint/2010/main" val="3431058603"/>
+      </p:ext>
+    </p:extLst>
+  </p:cSld>
+  <p:clrMapOvr>
+    <a:masterClrMapping/>
+  </p:clrMapOvr>
+</p:notes>
+</file>
+
+<file path=ppt/notesSlides/notesSlide2.xml><?xml version="1.0" encoding="utf-8"?>
+<p:notes xmlns:a="http://schemas.openxmlformats.org/drawingml/2006/main" xmlns:r="http://schemas.openxmlformats.org/officeDocument/2006/relationships" xmlns:p="http://schemas.openxmlformats.org/presentationml/2006/main">
+  <p:cSld>
+    <p:spTree>
+      <p:nvGrpSpPr>
+        <p:cNvPr id="1" name=""/>
+        <p:cNvGrpSpPr/>
+        <p:nvPr/>
+      </p:nvGrpSpPr>
+      <p:grpSpPr>
+        <a:xfrm>
+          <a:off x="0" y="0"/>
+          <a:ext cx="0" cy="0"/>
+          <a:chOff x="0" y="0"/>
+          <a:chExt cx="0" cy="0"/>
+        </a:xfrm>
+      </p:grpSpPr>
+      <p:sp>
+        <p:nvSpPr>
+          <p:cNvPr id="2" name="Slide Image Placeholder 1"/>
+          <p:cNvSpPr>
+            <a:spLocks noGrp="1" noRot="1" noChangeAspect="1"/>
+          </p:cNvSpPr>
+          <p:nvPr>
+            <p:ph type="sldImg"/>
+          </p:nvPr>
+        </p:nvSpPr>
+        <p:spPr/>
+      </p:sp>
+      <p:sp>
+        <p:nvSpPr>
+          <p:cNvPr id="3" name="Notes Placeholder 2"/>
+          <p:cNvSpPr>
+            <a:spLocks noGrp="1"/>
+          </p:cNvSpPr>
+          <p:nvPr>
+            <p:ph type="body" idx="1"/>
+          </p:nvPr>
+        </p:nvSpPr>
+        <p:spPr/>
+        <p:txBody>
+          <a:bodyPr/>
+          <a:lstStyle/>
+          <a:p>
+            <a:r>
+              <a:rPr lang="en-US" dirty="0" smtClean="0"/>
+              <a:t>Point</a:t>
+            </a:r>
+            <a:r>
+              <a:rPr lang="en-US" baseline="0" dirty="0" smtClean="0"/>
+              <a:t> 1.	A.V.A. seeks to improve on some of the common flaws that similarly existing programs in today’s age have. It should be look at as an idea, not as a business/ corporate </a:t>
+            </a:r>
+          </a:p>
+          <a:p>
+            <a:r>
+              <a:rPr lang="en-US" baseline="0" dirty="0" smtClean="0"/>
+              <a:t>	product ready to be launched to the public.</a:t>
+            </a:r>
+          </a:p>
+          <a:p>
+            <a:r>
+              <a:rPr lang="en-US" baseline="0" dirty="0" smtClean="0"/>
+              <a:t>Point 2.	Given the simplicity of the main chat capabilities and the light additional functions of the program, it is safe to say that in comparison to other large companies 	producing </a:t>
+            </a:r>
+            <a:r>
+              <a:rPr lang="en-US" baseline="0" dirty="0" err="1" smtClean="0"/>
+              <a:t>chatbot</a:t>
+            </a:r>
+            <a:r>
+              <a:rPr lang="en-US" baseline="0" dirty="0" smtClean="0"/>
+              <a:t> programs that this is a rather solid basis to start evolving from, a version 1 if you could put it otherwise.</a:t>
+            </a:r>
+          </a:p>
+          <a:p>
+            <a:r>
+              <a:rPr lang="en-US" baseline="0" dirty="0" smtClean="0"/>
+              <a:t>Point 3. 	The code for the program is not overly complex, but rather requires some time and dedication to get working. Any decent student with the right resources could easily</a:t>
+            </a:r>
+          </a:p>
+          <a:p>
+            <a:r>
+              <a:rPr lang="en-US" baseline="0" dirty="0" smtClean="0"/>
+              <a:t>	have the opportunity to replicate such a program, opening possibilities for this product to be used in other ways not originally intended (e.g. teaching material for 	coders)</a:t>
+            </a:r>
+          </a:p>
+          <a:p>
+            <a:r>
+              <a:rPr lang="en-US" baseline="0" dirty="0" smtClean="0"/>
+              <a:t>Point 4. 	It should not be forgotten that the focus of the product is not just on the program itself, but also on the HTML page and overall management of the team. The final 	product caters to everyone’s capabilities, and showcases that no weakness should be exploited</a:t>
+            </a:r>
+            <a:r>
+              <a:rPr lang="en-US" baseline="0" smtClean="0"/>
+              <a:t>. </a:t>
+            </a:r>
+            <a:endParaRPr lang="en-US" dirty="0"/>
+          </a:p>
+        </p:txBody>
+      </p:sp>
+      <p:sp>
+        <p:nvSpPr>
+          <p:cNvPr id="4" name="Slide Number Placeholder 3"/>
+          <p:cNvSpPr>
+            <a:spLocks noGrp="1"/>
+          </p:cNvSpPr>
+          <p:nvPr>
+            <p:ph type="sldNum" sz="quarter" idx="10"/>
+          </p:nvPr>
+        </p:nvSpPr>
+        <p:spPr/>
+        <p:txBody>
+          <a:bodyPr/>
+          <a:lstStyle/>
+          <a:p>
+            <a:fld id="{7221A80F-FD1A-4A18-9546-7A6E6A08D3E9}" type="slidenum">
+              <a:rPr lang="en-US" smtClean="0"/>
+              <a:t>13</a:t>
+            </a:fld>
+            <a:endParaRPr lang="en-US"/>
+          </a:p>
+        </p:txBody>
+      </p:sp>
+    </p:spTree>
+    <p:extLst>
+      <p:ext uri="{BB962C8B-B14F-4D97-AF65-F5344CB8AC3E}">
+        <p14:creationId xmlns:p14="http://schemas.microsoft.com/office/powerpoint/2010/main" val="1952161797"/>
+      </p:ext>
+    </p:extLst>
+  </p:cSld>
+  <p:clrMapOvr>
+    <a:masterClrMapping/>
+  </p:clrMapOvr>
+</p:notes>
+</file>
+
 <file path=ppt/slideLayouts/slideLayout1.xml><?xml version="1.0" encoding="utf-8"?>
 <p:sldLayout xmlns:a="http://schemas.openxmlformats.org/drawingml/2006/main" xmlns:r="http://schemas.openxmlformats.org/officeDocument/2006/relationships" xmlns:p="http://schemas.openxmlformats.org/presentationml/2006/main" type="title" preserve="1">
   <p:cSld name="Title Slide">
@@ -149,7 +760,7 @@
           <p:cNvPr id="2" name="Title 1">
             <a:extLst>
               <a:ext uri="{FF2B5EF4-FFF2-40B4-BE49-F238E27FC236}">
-                <a16:creationId xmlns:a16="http://schemas.microsoft.com/office/drawing/2014/main" id="{44CAD573-2F56-044F-B629-806587088303}"/>
+                <a16:creationId xmlns:a16="http://schemas.microsoft.com/office/drawing/2014/main" xmlns="" id="{44CAD573-2F56-044F-B629-806587088303}"/>
               </a:ext>
             </a:extLst>
           </p:cNvPr>
@@ -186,7 +797,7 @@
           <p:cNvPr id="3" name="Subtitle 2">
             <a:extLst>
               <a:ext uri="{FF2B5EF4-FFF2-40B4-BE49-F238E27FC236}">
-                <a16:creationId xmlns:a16="http://schemas.microsoft.com/office/drawing/2014/main" id="{7B878100-5365-384B-BA40-A7F38C7FDFF6}"/>
+                <a16:creationId xmlns:a16="http://schemas.microsoft.com/office/drawing/2014/main" xmlns="" id="{7B878100-5365-384B-BA40-A7F38C7FDFF6}"/>
               </a:ext>
             </a:extLst>
           </p:cNvPr>
@@ -256,7 +867,7 @@
           <p:cNvPr id="4" name="Date Placeholder 3">
             <a:extLst>
               <a:ext uri="{FF2B5EF4-FFF2-40B4-BE49-F238E27FC236}">
-                <a16:creationId xmlns:a16="http://schemas.microsoft.com/office/drawing/2014/main" id="{4D16142E-887F-634E-827E-EF62D7F3D115}"/>
+                <a16:creationId xmlns:a16="http://schemas.microsoft.com/office/drawing/2014/main" xmlns="" id="{4D16142E-887F-634E-827E-EF62D7F3D115}"/>
               </a:ext>
             </a:extLst>
           </p:cNvPr>
@@ -274,7 +885,7 @@
           <a:p>
             <a:fld id="{033AF4C7-B9F7-8C43-BECF-42CF3A22F2FA}" type="datetimeFigureOut">
               <a:rPr lang="en-US" smtClean="0"/>
-              <a:t>3/21/18</a:t>
+              <a:t>3/21/2018</a:t>
             </a:fld>
             <a:endParaRPr lang="en-US"/>
           </a:p>
@@ -285,7 +896,7 @@
           <p:cNvPr id="5" name="Footer Placeholder 4">
             <a:extLst>
               <a:ext uri="{FF2B5EF4-FFF2-40B4-BE49-F238E27FC236}">
-                <a16:creationId xmlns:a16="http://schemas.microsoft.com/office/drawing/2014/main" id="{BD980083-AB63-9C4E-A475-4B976561812F}"/>
+                <a16:creationId xmlns:a16="http://schemas.microsoft.com/office/drawing/2014/main" xmlns="" id="{BD980083-AB63-9C4E-A475-4B976561812F}"/>
               </a:ext>
             </a:extLst>
           </p:cNvPr>
@@ -310,7 +921,7 @@
           <p:cNvPr id="6" name="Slide Number Placeholder 5">
             <a:extLst>
               <a:ext uri="{FF2B5EF4-FFF2-40B4-BE49-F238E27FC236}">
-                <a16:creationId xmlns:a16="http://schemas.microsoft.com/office/drawing/2014/main" id="{23EB2BAA-FBA2-0E4B-B7EF-D74FB680AD7A}"/>
+                <a16:creationId xmlns:a16="http://schemas.microsoft.com/office/drawing/2014/main" xmlns="" id="{23EB2BAA-FBA2-0E4B-B7EF-D74FB680AD7A}"/>
               </a:ext>
             </a:extLst>
           </p:cNvPr>
@@ -369,7 +980,7 @@
           <p:cNvPr id="2" name="Title 1">
             <a:extLst>
               <a:ext uri="{FF2B5EF4-FFF2-40B4-BE49-F238E27FC236}">
-                <a16:creationId xmlns:a16="http://schemas.microsoft.com/office/drawing/2014/main" id="{EFA7239F-D586-3440-9282-E1E306341C0C}"/>
+                <a16:creationId xmlns:a16="http://schemas.microsoft.com/office/drawing/2014/main" xmlns="" id="{EFA7239F-D586-3440-9282-E1E306341C0C}"/>
               </a:ext>
             </a:extLst>
           </p:cNvPr>
@@ -397,7 +1008,7 @@
           <p:cNvPr id="3" name="Vertical Text Placeholder 2">
             <a:extLst>
               <a:ext uri="{FF2B5EF4-FFF2-40B4-BE49-F238E27FC236}">
-                <a16:creationId xmlns:a16="http://schemas.microsoft.com/office/drawing/2014/main" id="{D2556D89-A94C-6149-9C86-AB149639EE0C}"/>
+                <a16:creationId xmlns:a16="http://schemas.microsoft.com/office/drawing/2014/main" xmlns="" id="{D2556D89-A94C-6149-9C86-AB149639EE0C}"/>
               </a:ext>
             </a:extLst>
           </p:cNvPr>
@@ -454,7 +1065,7 @@
           <p:cNvPr id="4" name="Date Placeholder 3">
             <a:extLst>
               <a:ext uri="{FF2B5EF4-FFF2-40B4-BE49-F238E27FC236}">
-                <a16:creationId xmlns:a16="http://schemas.microsoft.com/office/drawing/2014/main" id="{B5DDB9EA-9E7E-274A-BC7A-6428AB3BC7B1}"/>
+                <a16:creationId xmlns:a16="http://schemas.microsoft.com/office/drawing/2014/main" xmlns="" id="{B5DDB9EA-9E7E-274A-BC7A-6428AB3BC7B1}"/>
               </a:ext>
             </a:extLst>
           </p:cNvPr>
@@ -472,7 +1083,7 @@
           <a:p>
             <a:fld id="{033AF4C7-B9F7-8C43-BECF-42CF3A22F2FA}" type="datetimeFigureOut">
               <a:rPr lang="en-US" smtClean="0"/>
-              <a:t>3/21/18</a:t>
+              <a:t>3/21/2018</a:t>
             </a:fld>
             <a:endParaRPr lang="en-US"/>
           </a:p>
@@ -483,7 +1094,7 @@
           <p:cNvPr id="5" name="Footer Placeholder 4">
             <a:extLst>
               <a:ext uri="{FF2B5EF4-FFF2-40B4-BE49-F238E27FC236}">
-                <a16:creationId xmlns:a16="http://schemas.microsoft.com/office/drawing/2014/main" id="{FB1CE387-A25B-4F48-8B4C-9FF1997C0732}"/>
+                <a16:creationId xmlns:a16="http://schemas.microsoft.com/office/drawing/2014/main" xmlns="" id="{FB1CE387-A25B-4F48-8B4C-9FF1997C0732}"/>
               </a:ext>
             </a:extLst>
           </p:cNvPr>
@@ -508,7 +1119,7 @@
           <p:cNvPr id="6" name="Slide Number Placeholder 5">
             <a:extLst>
               <a:ext uri="{FF2B5EF4-FFF2-40B4-BE49-F238E27FC236}">
-                <a16:creationId xmlns:a16="http://schemas.microsoft.com/office/drawing/2014/main" id="{D61122A1-D21A-6747-BF68-521252E7E7C3}"/>
+                <a16:creationId xmlns:a16="http://schemas.microsoft.com/office/drawing/2014/main" xmlns="" id="{D61122A1-D21A-6747-BF68-521252E7E7C3}"/>
               </a:ext>
             </a:extLst>
           </p:cNvPr>
@@ -567,7 +1178,7 @@
           <p:cNvPr id="2" name="Vertical Title 1">
             <a:extLst>
               <a:ext uri="{FF2B5EF4-FFF2-40B4-BE49-F238E27FC236}">
-                <a16:creationId xmlns:a16="http://schemas.microsoft.com/office/drawing/2014/main" id="{85BEEBE1-DAD6-2F43-8DF2-39AFA3E2F3E5}"/>
+                <a16:creationId xmlns:a16="http://schemas.microsoft.com/office/drawing/2014/main" xmlns="" id="{85BEEBE1-DAD6-2F43-8DF2-39AFA3E2F3E5}"/>
               </a:ext>
             </a:extLst>
           </p:cNvPr>
@@ -600,7 +1211,7 @@
           <p:cNvPr id="3" name="Vertical Text Placeholder 2">
             <a:extLst>
               <a:ext uri="{FF2B5EF4-FFF2-40B4-BE49-F238E27FC236}">
-                <a16:creationId xmlns:a16="http://schemas.microsoft.com/office/drawing/2014/main" id="{768B6838-CAF3-FF42-9022-AAFC8761F15C}"/>
+                <a16:creationId xmlns:a16="http://schemas.microsoft.com/office/drawing/2014/main" xmlns="" id="{768B6838-CAF3-FF42-9022-AAFC8761F15C}"/>
               </a:ext>
             </a:extLst>
           </p:cNvPr>
@@ -662,7 +1273,7 @@
           <p:cNvPr id="4" name="Date Placeholder 3">
             <a:extLst>
               <a:ext uri="{FF2B5EF4-FFF2-40B4-BE49-F238E27FC236}">
-                <a16:creationId xmlns:a16="http://schemas.microsoft.com/office/drawing/2014/main" id="{514E6109-37EC-4F47-AF80-273B3A0F975B}"/>
+                <a16:creationId xmlns:a16="http://schemas.microsoft.com/office/drawing/2014/main" xmlns="" id="{514E6109-37EC-4F47-AF80-273B3A0F975B}"/>
               </a:ext>
             </a:extLst>
           </p:cNvPr>
@@ -680,7 +1291,7 @@
           <a:p>
             <a:fld id="{033AF4C7-B9F7-8C43-BECF-42CF3A22F2FA}" type="datetimeFigureOut">
               <a:rPr lang="en-US" smtClean="0"/>
-              <a:t>3/21/18</a:t>
+              <a:t>3/21/2018</a:t>
             </a:fld>
             <a:endParaRPr lang="en-US"/>
           </a:p>
@@ -691,7 +1302,7 @@
           <p:cNvPr id="5" name="Footer Placeholder 4">
             <a:extLst>
               <a:ext uri="{FF2B5EF4-FFF2-40B4-BE49-F238E27FC236}">
-                <a16:creationId xmlns:a16="http://schemas.microsoft.com/office/drawing/2014/main" id="{15550147-53C4-024E-B564-788310094220}"/>
+                <a16:creationId xmlns:a16="http://schemas.microsoft.com/office/drawing/2014/main" xmlns="" id="{15550147-53C4-024E-B564-788310094220}"/>
               </a:ext>
             </a:extLst>
           </p:cNvPr>
@@ -716,7 +1327,7 @@
           <p:cNvPr id="6" name="Slide Number Placeholder 5">
             <a:extLst>
               <a:ext uri="{FF2B5EF4-FFF2-40B4-BE49-F238E27FC236}">
-                <a16:creationId xmlns:a16="http://schemas.microsoft.com/office/drawing/2014/main" id="{D42903BF-31B9-C44B-82AE-91BD8394E4F3}"/>
+                <a16:creationId xmlns:a16="http://schemas.microsoft.com/office/drawing/2014/main" xmlns="" id="{D42903BF-31B9-C44B-82AE-91BD8394E4F3}"/>
               </a:ext>
             </a:extLst>
           </p:cNvPr>
@@ -775,7 +1386,7 @@
           <p:cNvPr id="2" name="Title 1">
             <a:extLst>
               <a:ext uri="{FF2B5EF4-FFF2-40B4-BE49-F238E27FC236}">
-                <a16:creationId xmlns:a16="http://schemas.microsoft.com/office/drawing/2014/main" id="{20E534F2-3C7A-0D42-8574-35946C68BDE3}"/>
+                <a16:creationId xmlns:a16="http://schemas.microsoft.com/office/drawing/2014/main" xmlns="" id="{20E534F2-3C7A-0D42-8574-35946C68BDE3}"/>
               </a:ext>
             </a:extLst>
           </p:cNvPr>
@@ -803,7 +1414,7 @@
           <p:cNvPr id="3" name="Content Placeholder 2">
             <a:extLst>
               <a:ext uri="{FF2B5EF4-FFF2-40B4-BE49-F238E27FC236}">
-                <a16:creationId xmlns:a16="http://schemas.microsoft.com/office/drawing/2014/main" id="{A5A07681-D173-574E-9CE6-EA6037CE638A}"/>
+                <a16:creationId xmlns:a16="http://schemas.microsoft.com/office/drawing/2014/main" xmlns="" id="{A5A07681-D173-574E-9CE6-EA6037CE638A}"/>
               </a:ext>
             </a:extLst>
           </p:cNvPr>
@@ -860,7 +1471,7 @@
           <p:cNvPr id="4" name="Date Placeholder 3">
             <a:extLst>
               <a:ext uri="{FF2B5EF4-FFF2-40B4-BE49-F238E27FC236}">
-                <a16:creationId xmlns:a16="http://schemas.microsoft.com/office/drawing/2014/main" id="{9EE74F46-AE0B-CA4B-9ADA-B108579A01E6}"/>
+                <a16:creationId xmlns:a16="http://schemas.microsoft.com/office/drawing/2014/main" xmlns="" id="{9EE74F46-AE0B-CA4B-9ADA-B108579A01E6}"/>
               </a:ext>
             </a:extLst>
           </p:cNvPr>
@@ -878,7 +1489,7 @@
           <a:p>
             <a:fld id="{033AF4C7-B9F7-8C43-BECF-42CF3A22F2FA}" type="datetimeFigureOut">
               <a:rPr lang="en-US" smtClean="0"/>
-              <a:t>3/21/18</a:t>
+              <a:t>3/21/2018</a:t>
             </a:fld>
             <a:endParaRPr lang="en-US"/>
           </a:p>
@@ -889,7 +1500,7 @@
           <p:cNvPr id="5" name="Footer Placeholder 4">
             <a:extLst>
               <a:ext uri="{FF2B5EF4-FFF2-40B4-BE49-F238E27FC236}">
-                <a16:creationId xmlns:a16="http://schemas.microsoft.com/office/drawing/2014/main" id="{F5E2393F-CFC6-0B42-BABB-5F8B9357ECAD}"/>
+                <a16:creationId xmlns:a16="http://schemas.microsoft.com/office/drawing/2014/main" xmlns="" id="{F5E2393F-CFC6-0B42-BABB-5F8B9357ECAD}"/>
               </a:ext>
             </a:extLst>
           </p:cNvPr>
@@ -914,7 +1525,7 @@
           <p:cNvPr id="6" name="Slide Number Placeholder 5">
             <a:extLst>
               <a:ext uri="{FF2B5EF4-FFF2-40B4-BE49-F238E27FC236}">
-                <a16:creationId xmlns:a16="http://schemas.microsoft.com/office/drawing/2014/main" id="{60168D72-2814-9F45-965D-91308FBE5271}"/>
+                <a16:creationId xmlns:a16="http://schemas.microsoft.com/office/drawing/2014/main" xmlns="" id="{60168D72-2814-9F45-965D-91308FBE5271}"/>
               </a:ext>
             </a:extLst>
           </p:cNvPr>
@@ -973,7 +1584,7 @@
           <p:cNvPr id="2" name="Title 1">
             <a:extLst>
               <a:ext uri="{FF2B5EF4-FFF2-40B4-BE49-F238E27FC236}">
-                <a16:creationId xmlns:a16="http://schemas.microsoft.com/office/drawing/2014/main" id="{A5E4DE04-B2E3-864B-AD2B-33C551764849}"/>
+                <a16:creationId xmlns:a16="http://schemas.microsoft.com/office/drawing/2014/main" xmlns="" id="{A5E4DE04-B2E3-864B-AD2B-33C551764849}"/>
               </a:ext>
             </a:extLst>
           </p:cNvPr>
@@ -1010,7 +1621,7 @@
           <p:cNvPr id="3" name="Text Placeholder 2">
             <a:extLst>
               <a:ext uri="{FF2B5EF4-FFF2-40B4-BE49-F238E27FC236}">
-                <a16:creationId xmlns:a16="http://schemas.microsoft.com/office/drawing/2014/main" id="{3E6F3755-B9B4-274F-A8C5-B872F2564A36}"/>
+                <a16:creationId xmlns:a16="http://schemas.microsoft.com/office/drawing/2014/main" xmlns="" id="{3E6F3755-B9B4-274F-A8C5-B872F2564A36}"/>
               </a:ext>
             </a:extLst>
           </p:cNvPr>
@@ -1135,7 +1746,7 @@
           <p:cNvPr id="4" name="Date Placeholder 3">
             <a:extLst>
               <a:ext uri="{FF2B5EF4-FFF2-40B4-BE49-F238E27FC236}">
-                <a16:creationId xmlns:a16="http://schemas.microsoft.com/office/drawing/2014/main" id="{9B599376-88FB-DA47-ABA3-FCD3D1F5FA54}"/>
+                <a16:creationId xmlns:a16="http://schemas.microsoft.com/office/drawing/2014/main" xmlns="" id="{9B599376-88FB-DA47-ABA3-FCD3D1F5FA54}"/>
               </a:ext>
             </a:extLst>
           </p:cNvPr>
@@ -1153,7 +1764,7 @@
           <a:p>
             <a:fld id="{033AF4C7-B9F7-8C43-BECF-42CF3A22F2FA}" type="datetimeFigureOut">
               <a:rPr lang="en-US" smtClean="0"/>
-              <a:t>3/21/18</a:t>
+              <a:t>3/21/2018</a:t>
             </a:fld>
             <a:endParaRPr lang="en-US"/>
           </a:p>
@@ -1164,7 +1775,7 @@
           <p:cNvPr id="5" name="Footer Placeholder 4">
             <a:extLst>
               <a:ext uri="{FF2B5EF4-FFF2-40B4-BE49-F238E27FC236}">
-                <a16:creationId xmlns:a16="http://schemas.microsoft.com/office/drawing/2014/main" id="{2779B08B-D2A5-654A-9104-367A1F962365}"/>
+                <a16:creationId xmlns:a16="http://schemas.microsoft.com/office/drawing/2014/main" xmlns="" id="{2779B08B-D2A5-654A-9104-367A1F962365}"/>
               </a:ext>
             </a:extLst>
           </p:cNvPr>
@@ -1189,7 +1800,7 @@
           <p:cNvPr id="6" name="Slide Number Placeholder 5">
             <a:extLst>
               <a:ext uri="{FF2B5EF4-FFF2-40B4-BE49-F238E27FC236}">
-                <a16:creationId xmlns:a16="http://schemas.microsoft.com/office/drawing/2014/main" id="{05984929-97E4-F944-B680-6F586CFE1DF7}"/>
+                <a16:creationId xmlns:a16="http://schemas.microsoft.com/office/drawing/2014/main" xmlns="" id="{05984929-97E4-F944-B680-6F586CFE1DF7}"/>
               </a:ext>
             </a:extLst>
           </p:cNvPr>
@@ -1248,7 +1859,7 @@
           <p:cNvPr id="2" name="Title 1">
             <a:extLst>
               <a:ext uri="{FF2B5EF4-FFF2-40B4-BE49-F238E27FC236}">
-                <a16:creationId xmlns:a16="http://schemas.microsoft.com/office/drawing/2014/main" id="{6A93D3D9-FD52-C84D-83D6-886E76F68B04}"/>
+                <a16:creationId xmlns:a16="http://schemas.microsoft.com/office/drawing/2014/main" xmlns="" id="{6A93D3D9-FD52-C84D-83D6-886E76F68B04}"/>
               </a:ext>
             </a:extLst>
           </p:cNvPr>
@@ -1276,7 +1887,7 @@
           <p:cNvPr id="3" name="Content Placeholder 2">
             <a:extLst>
               <a:ext uri="{FF2B5EF4-FFF2-40B4-BE49-F238E27FC236}">
-                <a16:creationId xmlns:a16="http://schemas.microsoft.com/office/drawing/2014/main" id="{9433E958-13C0-0547-BEBE-A733D4E7260E}"/>
+                <a16:creationId xmlns:a16="http://schemas.microsoft.com/office/drawing/2014/main" xmlns="" id="{9433E958-13C0-0547-BEBE-A733D4E7260E}"/>
               </a:ext>
             </a:extLst>
           </p:cNvPr>
@@ -1338,7 +1949,7 @@
           <p:cNvPr id="4" name="Content Placeholder 3">
             <a:extLst>
               <a:ext uri="{FF2B5EF4-FFF2-40B4-BE49-F238E27FC236}">
-                <a16:creationId xmlns:a16="http://schemas.microsoft.com/office/drawing/2014/main" id="{A2AF4AFF-94FA-9640-9A69-F17ECC17835B}"/>
+                <a16:creationId xmlns:a16="http://schemas.microsoft.com/office/drawing/2014/main" xmlns="" id="{A2AF4AFF-94FA-9640-9A69-F17ECC17835B}"/>
               </a:ext>
             </a:extLst>
           </p:cNvPr>
@@ -1400,7 +2011,7 @@
           <p:cNvPr id="5" name="Date Placeholder 4">
             <a:extLst>
               <a:ext uri="{FF2B5EF4-FFF2-40B4-BE49-F238E27FC236}">
-                <a16:creationId xmlns:a16="http://schemas.microsoft.com/office/drawing/2014/main" id="{2274186B-D8D5-714A-87D2-57071D4180BF}"/>
+                <a16:creationId xmlns:a16="http://schemas.microsoft.com/office/drawing/2014/main" xmlns="" id="{2274186B-D8D5-714A-87D2-57071D4180BF}"/>
               </a:ext>
             </a:extLst>
           </p:cNvPr>
@@ -1418,7 +2029,7 @@
           <a:p>
             <a:fld id="{033AF4C7-B9F7-8C43-BECF-42CF3A22F2FA}" type="datetimeFigureOut">
               <a:rPr lang="en-US" smtClean="0"/>
-              <a:t>3/21/18</a:t>
+              <a:t>3/21/2018</a:t>
             </a:fld>
             <a:endParaRPr lang="en-US"/>
           </a:p>
@@ -1429,7 +2040,7 @@
           <p:cNvPr id="6" name="Footer Placeholder 5">
             <a:extLst>
               <a:ext uri="{FF2B5EF4-FFF2-40B4-BE49-F238E27FC236}">
-                <a16:creationId xmlns:a16="http://schemas.microsoft.com/office/drawing/2014/main" id="{14C9578B-5B96-AF42-8A43-33A7C7D8E92D}"/>
+                <a16:creationId xmlns:a16="http://schemas.microsoft.com/office/drawing/2014/main" xmlns="" id="{14C9578B-5B96-AF42-8A43-33A7C7D8E92D}"/>
               </a:ext>
             </a:extLst>
           </p:cNvPr>
@@ -1454,7 +2065,7 @@
           <p:cNvPr id="7" name="Slide Number Placeholder 6">
             <a:extLst>
               <a:ext uri="{FF2B5EF4-FFF2-40B4-BE49-F238E27FC236}">
-                <a16:creationId xmlns:a16="http://schemas.microsoft.com/office/drawing/2014/main" id="{8E89A072-C690-D242-8A38-C206E79E2BDA}"/>
+                <a16:creationId xmlns:a16="http://schemas.microsoft.com/office/drawing/2014/main" xmlns="" id="{8E89A072-C690-D242-8A38-C206E79E2BDA}"/>
               </a:ext>
             </a:extLst>
           </p:cNvPr>
@@ -1513,7 +2124,7 @@
           <p:cNvPr id="2" name="Title 1">
             <a:extLst>
               <a:ext uri="{FF2B5EF4-FFF2-40B4-BE49-F238E27FC236}">
-                <a16:creationId xmlns:a16="http://schemas.microsoft.com/office/drawing/2014/main" id="{A8E8EA2A-67E1-6D47-864D-7197C300024E}"/>
+                <a16:creationId xmlns:a16="http://schemas.microsoft.com/office/drawing/2014/main" xmlns="" id="{A8E8EA2A-67E1-6D47-864D-7197C300024E}"/>
               </a:ext>
             </a:extLst>
           </p:cNvPr>
@@ -1546,7 +2157,7 @@
           <p:cNvPr id="3" name="Text Placeholder 2">
             <a:extLst>
               <a:ext uri="{FF2B5EF4-FFF2-40B4-BE49-F238E27FC236}">
-                <a16:creationId xmlns:a16="http://schemas.microsoft.com/office/drawing/2014/main" id="{92CC70DD-A7F3-0740-A957-AD25E9FFA8E1}"/>
+                <a16:creationId xmlns:a16="http://schemas.microsoft.com/office/drawing/2014/main" xmlns="" id="{92CC70DD-A7F3-0740-A957-AD25E9FFA8E1}"/>
               </a:ext>
             </a:extLst>
           </p:cNvPr>
@@ -1617,7 +2228,7 @@
           <p:cNvPr id="4" name="Content Placeholder 3">
             <a:extLst>
               <a:ext uri="{FF2B5EF4-FFF2-40B4-BE49-F238E27FC236}">
-                <a16:creationId xmlns:a16="http://schemas.microsoft.com/office/drawing/2014/main" id="{A5FB7F1C-11AA-5143-AB95-4878D5C91931}"/>
+                <a16:creationId xmlns:a16="http://schemas.microsoft.com/office/drawing/2014/main" xmlns="" id="{A5FB7F1C-11AA-5143-AB95-4878D5C91931}"/>
               </a:ext>
             </a:extLst>
           </p:cNvPr>
@@ -1679,7 +2290,7 @@
           <p:cNvPr id="5" name="Text Placeholder 4">
             <a:extLst>
               <a:ext uri="{FF2B5EF4-FFF2-40B4-BE49-F238E27FC236}">
-                <a16:creationId xmlns:a16="http://schemas.microsoft.com/office/drawing/2014/main" id="{10780D48-C54B-3D4C-A8D2-11319DF7067D}"/>
+                <a16:creationId xmlns:a16="http://schemas.microsoft.com/office/drawing/2014/main" xmlns="" id="{10780D48-C54B-3D4C-A8D2-11319DF7067D}"/>
               </a:ext>
             </a:extLst>
           </p:cNvPr>
@@ -1750,7 +2361,7 @@
           <p:cNvPr id="6" name="Content Placeholder 5">
             <a:extLst>
               <a:ext uri="{FF2B5EF4-FFF2-40B4-BE49-F238E27FC236}">
-                <a16:creationId xmlns:a16="http://schemas.microsoft.com/office/drawing/2014/main" id="{C5E82F6B-D107-1749-BA03-98B173C326E9}"/>
+                <a16:creationId xmlns:a16="http://schemas.microsoft.com/office/drawing/2014/main" xmlns="" id="{C5E82F6B-D107-1749-BA03-98B173C326E9}"/>
               </a:ext>
             </a:extLst>
           </p:cNvPr>
@@ -1812,7 +2423,7 @@
           <p:cNvPr id="7" name="Date Placeholder 6">
             <a:extLst>
               <a:ext uri="{FF2B5EF4-FFF2-40B4-BE49-F238E27FC236}">
-                <a16:creationId xmlns:a16="http://schemas.microsoft.com/office/drawing/2014/main" id="{216D1FA1-B82C-B249-A475-88C680484964}"/>
+                <a16:creationId xmlns:a16="http://schemas.microsoft.com/office/drawing/2014/main" xmlns="" id="{216D1FA1-B82C-B249-A475-88C680484964}"/>
               </a:ext>
             </a:extLst>
           </p:cNvPr>
@@ -1830,7 +2441,7 @@
           <a:p>
             <a:fld id="{033AF4C7-B9F7-8C43-BECF-42CF3A22F2FA}" type="datetimeFigureOut">
               <a:rPr lang="en-US" smtClean="0"/>
-              <a:t>3/21/18</a:t>
+              <a:t>3/21/2018</a:t>
             </a:fld>
             <a:endParaRPr lang="en-US"/>
           </a:p>
@@ -1841,7 +2452,7 @@
           <p:cNvPr id="8" name="Footer Placeholder 7">
             <a:extLst>
               <a:ext uri="{FF2B5EF4-FFF2-40B4-BE49-F238E27FC236}">
-                <a16:creationId xmlns:a16="http://schemas.microsoft.com/office/drawing/2014/main" id="{FBA0013B-00AD-6943-B236-9AE379A276BD}"/>
+                <a16:creationId xmlns:a16="http://schemas.microsoft.com/office/drawing/2014/main" xmlns="" id="{FBA0013B-00AD-6943-B236-9AE379A276BD}"/>
               </a:ext>
             </a:extLst>
           </p:cNvPr>
@@ -1866,7 +2477,7 @@
           <p:cNvPr id="9" name="Slide Number Placeholder 8">
             <a:extLst>
               <a:ext uri="{FF2B5EF4-FFF2-40B4-BE49-F238E27FC236}">
-                <a16:creationId xmlns:a16="http://schemas.microsoft.com/office/drawing/2014/main" id="{0A58B420-ECEF-F045-81C0-3A9AE9A6AA30}"/>
+                <a16:creationId xmlns:a16="http://schemas.microsoft.com/office/drawing/2014/main" xmlns="" id="{0A58B420-ECEF-F045-81C0-3A9AE9A6AA30}"/>
               </a:ext>
             </a:extLst>
           </p:cNvPr>
@@ -1925,7 +2536,7 @@
           <p:cNvPr id="2" name="Title 1">
             <a:extLst>
               <a:ext uri="{FF2B5EF4-FFF2-40B4-BE49-F238E27FC236}">
-                <a16:creationId xmlns:a16="http://schemas.microsoft.com/office/drawing/2014/main" id="{9FEAAE35-1ECB-014A-8CBD-FFC4A6156AD3}"/>
+                <a16:creationId xmlns:a16="http://schemas.microsoft.com/office/drawing/2014/main" xmlns="" id="{9FEAAE35-1ECB-014A-8CBD-FFC4A6156AD3}"/>
               </a:ext>
             </a:extLst>
           </p:cNvPr>
@@ -1953,7 +2564,7 @@
           <p:cNvPr id="3" name="Date Placeholder 2">
             <a:extLst>
               <a:ext uri="{FF2B5EF4-FFF2-40B4-BE49-F238E27FC236}">
-                <a16:creationId xmlns:a16="http://schemas.microsoft.com/office/drawing/2014/main" id="{143EA251-33B7-5443-924D-7B05F50079BF}"/>
+                <a16:creationId xmlns:a16="http://schemas.microsoft.com/office/drawing/2014/main" xmlns="" id="{143EA251-33B7-5443-924D-7B05F50079BF}"/>
               </a:ext>
             </a:extLst>
           </p:cNvPr>
@@ -1971,7 +2582,7 @@
           <a:p>
             <a:fld id="{033AF4C7-B9F7-8C43-BECF-42CF3A22F2FA}" type="datetimeFigureOut">
               <a:rPr lang="en-US" smtClean="0"/>
-              <a:t>3/21/18</a:t>
+              <a:t>3/21/2018</a:t>
             </a:fld>
             <a:endParaRPr lang="en-US"/>
           </a:p>
@@ -1982,7 +2593,7 @@
           <p:cNvPr id="4" name="Footer Placeholder 3">
             <a:extLst>
               <a:ext uri="{FF2B5EF4-FFF2-40B4-BE49-F238E27FC236}">
-                <a16:creationId xmlns:a16="http://schemas.microsoft.com/office/drawing/2014/main" id="{C2FC4D53-E369-6241-A67C-C3309084445B}"/>
+                <a16:creationId xmlns:a16="http://schemas.microsoft.com/office/drawing/2014/main" xmlns="" id="{C2FC4D53-E369-6241-A67C-C3309084445B}"/>
               </a:ext>
             </a:extLst>
           </p:cNvPr>
@@ -2007,7 +2618,7 @@
           <p:cNvPr id="5" name="Slide Number Placeholder 4">
             <a:extLst>
               <a:ext uri="{FF2B5EF4-FFF2-40B4-BE49-F238E27FC236}">
-                <a16:creationId xmlns:a16="http://schemas.microsoft.com/office/drawing/2014/main" id="{F2306E35-538F-6841-9193-16A78507987A}"/>
+                <a16:creationId xmlns:a16="http://schemas.microsoft.com/office/drawing/2014/main" xmlns="" id="{F2306E35-538F-6841-9193-16A78507987A}"/>
               </a:ext>
             </a:extLst>
           </p:cNvPr>
@@ -2066,7 +2677,7 @@
           <p:cNvPr id="2" name="Date Placeholder 1">
             <a:extLst>
               <a:ext uri="{FF2B5EF4-FFF2-40B4-BE49-F238E27FC236}">
-                <a16:creationId xmlns:a16="http://schemas.microsoft.com/office/drawing/2014/main" id="{F7828390-8302-7548-9B89-695A431004F9}"/>
+                <a16:creationId xmlns:a16="http://schemas.microsoft.com/office/drawing/2014/main" xmlns="" id="{F7828390-8302-7548-9B89-695A431004F9}"/>
               </a:ext>
             </a:extLst>
           </p:cNvPr>
@@ -2084,7 +2695,7 @@
           <a:p>
             <a:fld id="{033AF4C7-B9F7-8C43-BECF-42CF3A22F2FA}" type="datetimeFigureOut">
               <a:rPr lang="en-US" smtClean="0"/>
-              <a:t>3/21/18</a:t>
+              <a:t>3/21/2018</a:t>
             </a:fld>
             <a:endParaRPr lang="en-US"/>
           </a:p>
@@ -2095,7 +2706,7 @@
           <p:cNvPr id="3" name="Footer Placeholder 2">
             <a:extLst>
               <a:ext uri="{FF2B5EF4-FFF2-40B4-BE49-F238E27FC236}">
-                <a16:creationId xmlns:a16="http://schemas.microsoft.com/office/drawing/2014/main" id="{6F10B0FE-A326-EA45-ACB6-28C835AA3BB9}"/>
+                <a16:creationId xmlns:a16="http://schemas.microsoft.com/office/drawing/2014/main" xmlns="" id="{6F10B0FE-A326-EA45-ACB6-28C835AA3BB9}"/>
               </a:ext>
             </a:extLst>
           </p:cNvPr>
@@ -2120,7 +2731,7 @@
           <p:cNvPr id="4" name="Slide Number Placeholder 3">
             <a:extLst>
               <a:ext uri="{FF2B5EF4-FFF2-40B4-BE49-F238E27FC236}">
-                <a16:creationId xmlns:a16="http://schemas.microsoft.com/office/drawing/2014/main" id="{6FBAD0F1-D8F8-AA46-AE1A-99F8030F33B2}"/>
+                <a16:creationId xmlns:a16="http://schemas.microsoft.com/office/drawing/2014/main" xmlns="" id="{6FBAD0F1-D8F8-AA46-AE1A-99F8030F33B2}"/>
               </a:ext>
             </a:extLst>
           </p:cNvPr>
@@ -2179,7 +2790,7 @@
           <p:cNvPr id="2" name="Title 1">
             <a:extLst>
               <a:ext uri="{FF2B5EF4-FFF2-40B4-BE49-F238E27FC236}">
-                <a16:creationId xmlns:a16="http://schemas.microsoft.com/office/drawing/2014/main" id="{037D2FA7-52D2-D04D-90BF-F7D488D43CB4}"/>
+                <a16:creationId xmlns:a16="http://schemas.microsoft.com/office/drawing/2014/main" xmlns="" id="{037D2FA7-52D2-D04D-90BF-F7D488D43CB4}"/>
               </a:ext>
             </a:extLst>
           </p:cNvPr>
@@ -2216,7 +2827,7 @@
           <p:cNvPr id="3" name="Content Placeholder 2">
             <a:extLst>
               <a:ext uri="{FF2B5EF4-FFF2-40B4-BE49-F238E27FC236}">
-                <a16:creationId xmlns:a16="http://schemas.microsoft.com/office/drawing/2014/main" id="{00C0310B-DBEE-BA48-BB86-AFB636A454B9}"/>
+                <a16:creationId xmlns:a16="http://schemas.microsoft.com/office/drawing/2014/main" xmlns="" id="{00C0310B-DBEE-BA48-BB86-AFB636A454B9}"/>
               </a:ext>
             </a:extLst>
           </p:cNvPr>
@@ -2306,7 +2917,7 @@
           <p:cNvPr id="4" name="Text Placeholder 3">
             <a:extLst>
               <a:ext uri="{FF2B5EF4-FFF2-40B4-BE49-F238E27FC236}">
-                <a16:creationId xmlns:a16="http://schemas.microsoft.com/office/drawing/2014/main" id="{14A169D4-A7EC-0046-92AE-FE8B545BDD40}"/>
+                <a16:creationId xmlns:a16="http://schemas.microsoft.com/office/drawing/2014/main" xmlns="" id="{14A169D4-A7EC-0046-92AE-FE8B545BDD40}"/>
               </a:ext>
             </a:extLst>
           </p:cNvPr>
@@ -2377,7 +2988,7 @@
           <p:cNvPr id="5" name="Date Placeholder 4">
             <a:extLst>
               <a:ext uri="{FF2B5EF4-FFF2-40B4-BE49-F238E27FC236}">
-                <a16:creationId xmlns:a16="http://schemas.microsoft.com/office/drawing/2014/main" id="{2F8AA4A3-89B2-4143-BCEE-CE4E6DF43725}"/>
+                <a16:creationId xmlns:a16="http://schemas.microsoft.com/office/drawing/2014/main" xmlns="" id="{2F8AA4A3-89B2-4143-BCEE-CE4E6DF43725}"/>
               </a:ext>
             </a:extLst>
           </p:cNvPr>
@@ -2395,7 +3006,7 @@
           <a:p>
             <a:fld id="{033AF4C7-B9F7-8C43-BECF-42CF3A22F2FA}" type="datetimeFigureOut">
               <a:rPr lang="en-US" smtClean="0"/>
-              <a:t>3/21/18</a:t>
+              <a:t>3/21/2018</a:t>
             </a:fld>
             <a:endParaRPr lang="en-US"/>
           </a:p>
@@ -2406,7 +3017,7 @@
           <p:cNvPr id="6" name="Footer Placeholder 5">
             <a:extLst>
               <a:ext uri="{FF2B5EF4-FFF2-40B4-BE49-F238E27FC236}">
-                <a16:creationId xmlns:a16="http://schemas.microsoft.com/office/drawing/2014/main" id="{C79E965F-CBB2-BF42-8CE1-AE048D02F7ED}"/>
+                <a16:creationId xmlns:a16="http://schemas.microsoft.com/office/drawing/2014/main" xmlns="" id="{C79E965F-CBB2-BF42-8CE1-AE048D02F7ED}"/>
               </a:ext>
             </a:extLst>
           </p:cNvPr>
@@ -2431,7 +3042,7 @@
           <p:cNvPr id="7" name="Slide Number Placeholder 6">
             <a:extLst>
               <a:ext uri="{FF2B5EF4-FFF2-40B4-BE49-F238E27FC236}">
-                <a16:creationId xmlns:a16="http://schemas.microsoft.com/office/drawing/2014/main" id="{4E4C5D6F-0523-D947-AAF8-EE762D23F4C3}"/>
+                <a16:creationId xmlns:a16="http://schemas.microsoft.com/office/drawing/2014/main" xmlns="" id="{4E4C5D6F-0523-D947-AAF8-EE762D23F4C3}"/>
               </a:ext>
             </a:extLst>
           </p:cNvPr>
@@ -2490,7 +3101,7 @@
           <p:cNvPr id="2" name="Title 1">
             <a:extLst>
               <a:ext uri="{FF2B5EF4-FFF2-40B4-BE49-F238E27FC236}">
-                <a16:creationId xmlns:a16="http://schemas.microsoft.com/office/drawing/2014/main" id="{0A3C86CB-EFC1-034C-9184-53F50D39368A}"/>
+                <a16:creationId xmlns:a16="http://schemas.microsoft.com/office/drawing/2014/main" xmlns="" id="{0A3C86CB-EFC1-034C-9184-53F50D39368A}"/>
               </a:ext>
             </a:extLst>
           </p:cNvPr>
@@ -2527,7 +3138,7 @@
           <p:cNvPr id="3" name="Picture Placeholder 2">
             <a:extLst>
               <a:ext uri="{FF2B5EF4-FFF2-40B4-BE49-F238E27FC236}">
-                <a16:creationId xmlns:a16="http://schemas.microsoft.com/office/drawing/2014/main" id="{E36BF559-F70C-2B45-9BA3-084D0AE27613}"/>
+                <a16:creationId xmlns:a16="http://schemas.microsoft.com/office/drawing/2014/main" xmlns="" id="{E36BF559-F70C-2B45-9BA3-084D0AE27613}"/>
               </a:ext>
             </a:extLst>
           </p:cNvPr>
@@ -2594,7 +3205,7 @@
           <p:cNvPr id="4" name="Text Placeholder 3">
             <a:extLst>
               <a:ext uri="{FF2B5EF4-FFF2-40B4-BE49-F238E27FC236}">
-                <a16:creationId xmlns:a16="http://schemas.microsoft.com/office/drawing/2014/main" id="{8D135F04-F12C-BB46-82B0-FC3C1246021D}"/>
+                <a16:creationId xmlns:a16="http://schemas.microsoft.com/office/drawing/2014/main" xmlns="" id="{8D135F04-F12C-BB46-82B0-FC3C1246021D}"/>
               </a:ext>
             </a:extLst>
           </p:cNvPr>
@@ -2665,7 +3276,7 @@
           <p:cNvPr id="5" name="Date Placeholder 4">
             <a:extLst>
               <a:ext uri="{FF2B5EF4-FFF2-40B4-BE49-F238E27FC236}">
-                <a16:creationId xmlns:a16="http://schemas.microsoft.com/office/drawing/2014/main" id="{B28D8818-8AFD-7E40-A427-B89A4C024334}"/>
+                <a16:creationId xmlns:a16="http://schemas.microsoft.com/office/drawing/2014/main" xmlns="" id="{B28D8818-8AFD-7E40-A427-B89A4C024334}"/>
               </a:ext>
             </a:extLst>
           </p:cNvPr>
@@ -2683,7 +3294,7 @@
           <a:p>
             <a:fld id="{033AF4C7-B9F7-8C43-BECF-42CF3A22F2FA}" type="datetimeFigureOut">
               <a:rPr lang="en-US" smtClean="0"/>
-              <a:t>3/21/18</a:t>
+              <a:t>3/21/2018</a:t>
             </a:fld>
             <a:endParaRPr lang="en-US"/>
           </a:p>
@@ -2694,7 +3305,7 @@
           <p:cNvPr id="6" name="Footer Placeholder 5">
             <a:extLst>
               <a:ext uri="{FF2B5EF4-FFF2-40B4-BE49-F238E27FC236}">
-                <a16:creationId xmlns:a16="http://schemas.microsoft.com/office/drawing/2014/main" id="{4463074F-56A1-7A4B-9481-6D224A4C1DB7}"/>
+                <a16:creationId xmlns:a16="http://schemas.microsoft.com/office/drawing/2014/main" xmlns="" id="{4463074F-56A1-7A4B-9481-6D224A4C1DB7}"/>
               </a:ext>
             </a:extLst>
           </p:cNvPr>
@@ -2719,7 +3330,7 @@
           <p:cNvPr id="7" name="Slide Number Placeholder 6">
             <a:extLst>
               <a:ext uri="{FF2B5EF4-FFF2-40B4-BE49-F238E27FC236}">
-                <a16:creationId xmlns:a16="http://schemas.microsoft.com/office/drawing/2014/main" id="{D2A73CDF-EBF9-3544-AA08-BED66FA063F7}"/>
+                <a16:creationId xmlns:a16="http://schemas.microsoft.com/office/drawing/2014/main" xmlns="" id="{D2A73CDF-EBF9-3544-AA08-BED66FA063F7}"/>
               </a:ext>
             </a:extLst>
           </p:cNvPr>
@@ -2792,7 +3403,7 @@
           <p:cNvPr id="2" name="Title Placeholder 1">
             <a:extLst>
               <a:ext uri="{FF2B5EF4-FFF2-40B4-BE49-F238E27FC236}">
-                <a16:creationId xmlns:a16="http://schemas.microsoft.com/office/drawing/2014/main" id="{B9F90321-A415-394B-880E-FF69B581E52E}"/>
+                <a16:creationId xmlns:a16="http://schemas.microsoft.com/office/drawing/2014/main" xmlns="" id="{B9F90321-A415-394B-880E-FF69B581E52E}"/>
               </a:ext>
             </a:extLst>
           </p:cNvPr>
@@ -2830,7 +3441,7 @@
           <p:cNvPr id="3" name="Text Placeholder 2">
             <a:extLst>
               <a:ext uri="{FF2B5EF4-FFF2-40B4-BE49-F238E27FC236}">
-                <a16:creationId xmlns:a16="http://schemas.microsoft.com/office/drawing/2014/main" id="{24811165-F2BB-3342-A6E5-9D99E5C2571D}"/>
+                <a16:creationId xmlns:a16="http://schemas.microsoft.com/office/drawing/2014/main" xmlns="" id="{24811165-F2BB-3342-A6E5-9D99E5C2571D}"/>
               </a:ext>
             </a:extLst>
           </p:cNvPr>
@@ -2897,7 +3508,7 @@
           <p:cNvPr id="4" name="Date Placeholder 3">
             <a:extLst>
               <a:ext uri="{FF2B5EF4-FFF2-40B4-BE49-F238E27FC236}">
-                <a16:creationId xmlns:a16="http://schemas.microsoft.com/office/drawing/2014/main" id="{656AAE04-8FCD-7348-96C0-3B62AE8700AF}"/>
+                <a16:creationId xmlns:a16="http://schemas.microsoft.com/office/drawing/2014/main" xmlns="" id="{656AAE04-8FCD-7348-96C0-3B62AE8700AF}"/>
               </a:ext>
             </a:extLst>
           </p:cNvPr>
@@ -2933,7 +3544,7 @@
           <a:p>
             <a:fld id="{033AF4C7-B9F7-8C43-BECF-42CF3A22F2FA}" type="datetimeFigureOut">
               <a:rPr lang="en-US" smtClean="0"/>
-              <a:t>3/21/18</a:t>
+              <a:t>3/21/2018</a:t>
             </a:fld>
             <a:endParaRPr lang="en-US"/>
           </a:p>
@@ -2944,7 +3555,7 @@
           <p:cNvPr id="5" name="Footer Placeholder 4">
             <a:extLst>
               <a:ext uri="{FF2B5EF4-FFF2-40B4-BE49-F238E27FC236}">
-                <a16:creationId xmlns:a16="http://schemas.microsoft.com/office/drawing/2014/main" id="{1CFFAD0B-7C37-DF4A-B95B-55A433C9ED7A}"/>
+                <a16:creationId xmlns:a16="http://schemas.microsoft.com/office/drawing/2014/main" xmlns="" id="{1CFFAD0B-7C37-DF4A-B95B-55A433C9ED7A}"/>
               </a:ext>
             </a:extLst>
           </p:cNvPr>
@@ -2987,7 +3598,7 @@
           <p:cNvPr id="6" name="Slide Number Placeholder 5">
             <a:extLst>
               <a:ext uri="{FF2B5EF4-FFF2-40B4-BE49-F238E27FC236}">
-                <a16:creationId xmlns:a16="http://schemas.microsoft.com/office/drawing/2014/main" id="{B5A5BC0C-790F-3446-A27A-D3D035CA3A97}"/>
+                <a16:creationId xmlns:a16="http://schemas.microsoft.com/office/drawing/2014/main" xmlns="" id="{B5A5BC0C-790F-3446-A27A-D3D035CA3A97}"/>
               </a:ext>
             </a:extLst>
           </p:cNvPr>
@@ -3355,7 +3966,7 @@
           <p:cNvPr id="6" name="Round Diagonal Corner Rectangle 5">
             <a:extLst>
               <a:ext uri="{FF2B5EF4-FFF2-40B4-BE49-F238E27FC236}">
-                <a16:creationId xmlns:a16="http://schemas.microsoft.com/office/drawing/2014/main" id="{0324B2BB-09B6-6144-8FC6-D86E91180F56}"/>
+                <a16:creationId xmlns:a16="http://schemas.microsoft.com/office/drawing/2014/main" xmlns="" id="{0324B2BB-09B6-6144-8FC6-D86E91180F56}"/>
               </a:ext>
             </a:extLst>
           </p:cNvPr>
@@ -3406,7 +4017,7 @@
           <p:cNvPr id="7" name="TextBox 6">
             <a:extLst>
               <a:ext uri="{FF2B5EF4-FFF2-40B4-BE49-F238E27FC236}">
-                <a16:creationId xmlns:a16="http://schemas.microsoft.com/office/drawing/2014/main" id="{3C69E25C-3A83-2748-AE10-2BA1EF7510E3}"/>
+                <a16:creationId xmlns:a16="http://schemas.microsoft.com/office/drawing/2014/main" xmlns="" id="{3C69E25C-3A83-2748-AE10-2BA1EF7510E3}"/>
               </a:ext>
             </a:extLst>
           </p:cNvPr>
@@ -3652,7 +4263,7 @@
           <p:cNvPr id="2" name="Title 1">
             <a:extLst>
               <a:ext uri="{FF2B5EF4-FFF2-40B4-BE49-F238E27FC236}">
-                <a16:creationId xmlns:a16="http://schemas.microsoft.com/office/drawing/2014/main" id="{02FE362D-C461-D349-95B6-E2ACFE3EDD7D}"/>
+                <a16:creationId xmlns:a16="http://schemas.microsoft.com/office/drawing/2014/main" xmlns="" id="{02FE362D-C461-D349-95B6-E2ACFE3EDD7D}"/>
               </a:ext>
             </a:extLst>
           </p:cNvPr>
@@ -3681,7 +4292,7 @@
           <p:cNvPr id="3" name="Content Placeholder 2">
             <a:extLst>
               <a:ext uri="{FF2B5EF4-FFF2-40B4-BE49-F238E27FC236}">
-                <a16:creationId xmlns:a16="http://schemas.microsoft.com/office/drawing/2014/main" id="{372D8203-6BEB-424A-A515-E62F07B4328E}"/>
+                <a16:creationId xmlns:a16="http://schemas.microsoft.com/office/drawing/2014/main" xmlns="" id="{372D8203-6BEB-424A-A515-E62F07B4328E}"/>
               </a:ext>
             </a:extLst>
           </p:cNvPr>
@@ -3697,10 +4308,212 @@
           <a:bodyPr/>
           <a:lstStyle/>
           <a:p>
-            <a:endParaRPr lang="en-US"/>
-          </a:p>
-        </p:txBody>
-      </p:sp>
+            <a:r>
+              <a:rPr lang="en-US" dirty="0" smtClean="0"/>
+              <a:t>Agile Practice</a:t>
+            </a:r>
+          </a:p>
+          <a:p>
+            <a:pPr lvl="1"/>
+            <a:r>
+              <a:rPr lang="en-US" dirty="0" smtClean="0"/>
+              <a:t>Flexibility</a:t>
+            </a:r>
+          </a:p>
+          <a:p>
+            <a:pPr lvl="1"/>
+            <a:r>
+              <a:rPr lang="en-US" dirty="0" smtClean="0"/>
+              <a:t>Easy to Manage</a:t>
+            </a:r>
+            <a:endParaRPr lang="en-US" dirty="0"/>
+          </a:p>
+          <a:p>
+            <a:pPr lvl="1"/>
+            <a:endParaRPr lang="en-US" dirty="0" smtClean="0"/>
+          </a:p>
+          <a:p>
+            <a:r>
+              <a:rPr lang="en-US" dirty="0" smtClean="0"/>
+              <a:t>Pivotal Tracker vs. Trello</a:t>
+            </a:r>
+          </a:p>
+          <a:p>
+            <a:pPr marL="0" indent="0">
+              <a:buNone/>
+            </a:pPr>
+            <a:endParaRPr lang="en-US" dirty="0" smtClean="0"/>
+          </a:p>
+          <a:p>
+            <a:endParaRPr lang="en-US" dirty="0"/>
+          </a:p>
+        </p:txBody>
+      </p:sp>
+      <p:graphicFrame>
+        <p:nvGraphicFramePr>
+          <p:cNvPr id="4" name="Table 3"/>
+          <p:cNvGraphicFramePr>
+            <a:graphicFrameLocks noGrp="1"/>
+          </p:cNvGraphicFramePr>
+          <p:nvPr>
+            <p:extLst>
+              <p:ext uri="{D42A27DB-BD31-4B8C-83A1-F6EECF244321}">
+                <p14:modId xmlns:p14="http://schemas.microsoft.com/office/powerpoint/2010/main" val="1999302442"/>
+              </p:ext>
+            </p:extLst>
+          </p:nvPr>
+        </p:nvGraphicFramePr>
+        <p:xfrm>
+          <a:off x="440266" y="4001294"/>
+          <a:ext cx="8128000" cy="1752600"/>
+        </p:xfrm>
+        <a:graphic>
+          <a:graphicData uri="http://schemas.openxmlformats.org/drawingml/2006/table">
+            <a:tbl>
+              <a:tblPr firstRow="1" bandRow="1">
+                <a:tableStyleId>{073A0DAA-6AF3-43AB-8588-CEC1D06C72B9}</a:tableStyleId>
+              </a:tblPr>
+              <a:tblGrid>
+                <a:gridCol w="4064000"/>
+                <a:gridCol w="4064000"/>
+              </a:tblGrid>
+              <a:tr h="370840">
+                <a:tc>
+                  <a:txBody>
+                    <a:bodyPr/>
+                    <a:lstStyle/>
+                    <a:p>
+                      <a:pPr algn="ctr"/>
+                      <a:r>
+                        <a:rPr lang="en-US" dirty="0" smtClean="0"/>
+                        <a:t>Pivotal Tracker</a:t>
+                      </a:r>
+                      <a:endParaRPr lang="en-US" dirty="0"/>
+                    </a:p>
+                  </a:txBody>
+                  <a:tcPr/>
+                </a:tc>
+                <a:tc>
+                  <a:txBody>
+                    <a:bodyPr/>
+                    <a:lstStyle/>
+                    <a:p>
+                      <a:pPr algn="ctr"/>
+                      <a:r>
+                        <a:rPr lang="en-US" dirty="0" smtClean="0"/>
+                        <a:t>Trello</a:t>
+                      </a:r>
+                      <a:endParaRPr lang="en-US" dirty="0"/>
+                    </a:p>
+                  </a:txBody>
+                  <a:tcPr/>
+                </a:tc>
+              </a:tr>
+              <a:tr h="370840">
+                <a:tc>
+                  <a:txBody>
+                    <a:bodyPr/>
+                    <a:lstStyle/>
+                    <a:p>
+                      <a:pPr algn="ctr"/>
+                      <a:r>
+                        <a:rPr lang="en-US" dirty="0" smtClean="0"/>
+                        <a:t>Story-based</a:t>
+                      </a:r>
+                      <a:r>
+                        <a:rPr lang="en-US" baseline="0" dirty="0" smtClean="0"/>
+                        <a:t> project management tool</a:t>
+                      </a:r>
+                      <a:endParaRPr lang="en-US" dirty="0"/>
+                    </a:p>
+                  </a:txBody>
+                  <a:tcPr/>
+                </a:tc>
+                <a:tc>
+                  <a:txBody>
+                    <a:bodyPr/>
+                    <a:lstStyle/>
+                    <a:p>
+                      <a:pPr algn="ctr"/>
+                      <a:r>
+                        <a:rPr lang="en-US" dirty="0" smtClean="0"/>
+                        <a:t>Board-style</a:t>
+                      </a:r>
+                      <a:r>
+                        <a:rPr lang="en-US" baseline="0" dirty="0" smtClean="0"/>
+                        <a:t> project management tool</a:t>
+                      </a:r>
+                    </a:p>
+                  </a:txBody>
+                  <a:tcPr/>
+                </a:tc>
+              </a:tr>
+              <a:tr h="370840">
+                <a:tc>
+                  <a:txBody>
+                    <a:bodyPr/>
+                    <a:lstStyle/>
+                    <a:p>
+                      <a:pPr algn="ctr"/>
+                      <a:r>
+                        <a:rPr lang="en-US" dirty="0" smtClean="0"/>
+                        <a:t>Suited for high-level agile workflow</a:t>
+                      </a:r>
+                      <a:endParaRPr lang="en-US" dirty="0"/>
+                    </a:p>
+                  </a:txBody>
+                  <a:tcPr/>
+                </a:tc>
+                <a:tc>
+                  <a:txBody>
+                    <a:bodyPr/>
+                    <a:lstStyle/>
+                    <a:p>
+                      <a:pPr algn="ctr"/>
+                      <a:r>
+                        <a:rPr lang="en-US" baseline="0" dirty="0" smtClean="0"/>
+                        <a:t>Suited for low-level projects over a long span of time</a:t>
+                      </a:r>
+                    </a:p>
+                  </a:txBody>
+                  <a:tcPr/>
+                </a:tc>
+              </a:tr>
+              <a:tr h="370840">
+                <a:tc>
+                  <a:txBody>
+                    <a:bodyPr/>
+                    <a:lstStyle/>
+                    <a:p>
+                      <a:pPr algn="ctr"/>
+                      <a:r>
+                        <a:rPr lang="en-US" dirty="0" smtClean="0"/>
+                        <a:t>Free for up to 3 users for 30-days</a:t>
+                      </a:r>
+                      <a:endParaRPr lang="en-US" dirty="0"/>
+                    </a:p>
+                  </a:txBody>
+                  <a:tcPr/>
+                </a:tc>
+                <a:tc>
+                  <a:txBody>
+                    <a:bodyPr/>
+                    <a:lstStyle/>
+                    <a:p>
+                      <a:pPr algn="ctr"/>
+                      <a:r>
+                        <a:rPr lang="en-US" baseline="0" dirty="0" smtClean="0"/>
+                        <a:t>Free (Pay for additional storage space)</a:t>
+                      </a:r>
+                    </a:p>
+                  </a:txBody>
+                  <a:tcPr/>
+                </a:tc>
+              </a:tr>
+            </a:tbl>
+          </a:graphicData>
+        </a:graphic>
+      </p:graphicFrame>
     </p:spTree>
     <p:extLst>
       <p:ext uri="{BB962C8B-B14F-4D97-AF65-F5344CB8AC3E}">
@@ -3736,7 +4549,7 @@
           <p:cNvPr id="2" name="Title 1">
             <a:extLst>
               <a:ext uri="{FF2B5EF4-FFF2-40B4-BE49-F238E27FC236}">
-                <a16:creationId xmlns:a16="http://schemas.microsoft.com/office/drawing/2014/main" id="{16E2B136-6D13-BE4B-B14F-D07906BD7190}"/>
+                <a16:creationId xmlns:a16="http://schemas.microsoft.com/office/drawing/2014/main" xmlns="" id="{16E2B136-6D13-BE4B-B14F-D07906BD7190}"/>
               </a:ext>
             </a:extLst>
           </p:cNvPr>
@@ -3764,7 +4577,7 @@
           <p:cNvPr id="3" name="Content Placeholder 2">
             <a:extLst>
               <a:ext uri="{FF2B5EF4-FFF2-40B4-BE49-F238E27FC236}">
-                <a16:creationId xmlns:a16="http://schemas.microsoft.com/office/drawing/2014/main" id="{01568967-352F-C544-9C71-95BDE616181A}"/>
+                <a16:creationId xmlns:a16="http://schemas.microsoft.com/office/drawing/2014/main" xmlns="" id="{01568967-352F-C544-9C71-95BDE616181A}"/>
               </a:ext>
             </a:extLst>
           </p:cNvPr>
@@ -3775,12 +4588,121 @@
             <p:ph idx="1"/>
           </p:nvPr>
         </p:nvSpPr>
-        <p:spPr/>
-        <p:txBody>
-          <a:bodyPr/>
-          <a:lstStyle/>
-          <a:p>
-            <a:endParaRPr lang="en-US"/>
+        <p:spPr>
+          <a:xfrm>
+            <a:off x="838200" y="1825625"/>
+            <a:ext cx="10515600" cy="4838786"/>
+          </a:xfrm>
+        </p:spPr>
+        <p:txBody>
+          <a:bodyPr>
+            <a:normAutofit/>
+          </a:bodyPr>
+          <a:lstStyle/>
+          <a:p>
+            <a:r>
+              <a:rPr lang="en-US" dirty="0" smtClean="0"/>
+              <a:t>Completed:</a:t>
+            </a:r>
+          </a:p>
+          <a:p>
+            <a:pPr lvl="1"/>
+            <a:r>
+              <a:rPr lang="en-US" dirty="0"/>
+              <a:t>Basic question-answer response</a:t>
+            </a:r>
+          </a:p>
+          <a:p>
+            <a:pPr lvl="1"/>
+            <a:r>
+              <a:rPr lang="en-US" dirty="0"/>
+              <a:t>Quick factual searches</a:t>
+            </a:r>
+          </a:p>
+          <a:p>
+            <a:pPr lvl="1"/>
+            <a:r>
+              <a:rPr lang="en-US" dirty="0"/>
+              <a:t>Simple interaction with other applications</a:t>
+            </a:r>
+          </a:p>
+          <a:p>
+            <a:pPr lvl="1"/>
+            <a:r>
+              <a:rPr lang="en-US" dirty="0" smtClean="0"/>
+              <a:t>Text-to-speech</a:t>
+            </a:r>
+          </a:p>
+          <a:p>
+            <a:pPr lvl="1"/>
+            <a:r>
+              <a:rPr lang="en-US" dirty="0" smtClean="0"/>
+              <a:t>Cross-platform compatibility</a:t>
+            </a:r>
+            <a:endParaRPr lang="en-US" dirty="0"/>
+          </a:p>
+          <a:p>
+            <a:pPr lvl="1"/>
+            <a:endParaRPr lang="en-US" dirty="0" smtClean="0"/>
+          </a:p>
+          <a:p>
+            <a:r>
+              <a:rPr lang="en-US" dirty="0" smtClean="0"/>
+              <a:t>Incomplete:</a:t>
+            </a:r>
+          </a:p>
+          <a:p>
+            <a:pPr lvl="1"/>
+            <a:r>
+              <a:rPr lang="en-US" dirty="0" smtClean="0"/>
+              <a:t>Profile system</a:t>
+            </a:r>
+          </a:p>
+          <a:p>
+            <a:pPr lvl="1"/>
+            <a:r>
+              <a:rPr lang="en-US" dirty="0"/>
+              <a:t>E</a:t>
+            </a:r>
+            <a:r>
+              <a:rPr lang="en-US" dirty="0" smtClean="0"/>
+              <a:t>mergency Services/ </a:t>
+            </a:r>
+            <a:r>
+              <a:rPr lang="en-US" dirty="0"/>
+              <a:t>S</a:t>
+            </a:r>
+            <a:r>
+              <a:rPr lang="en-US" dirty="0" smtClean="0"/>
+              <a:t>upport </a:t>
+            </a:r>
+            <a:r>
+              <a:rPr lang="en-US" dirty="0"/>
+              <a:t>S</a:t>
+            </a:r>
+            <a:r>
+              <a:rPr lang="en-US" dirty="0" smtClean="0"/>
+              <a:t>ocieties triggers</a:t>
+            </a:r>
+          </a:p>
+          <a:p>
+            <a:pPr lvl="1"/>
+            <a:r>
+              <a:rPr lang="en-US" dirty="0" smtClean="0"/>
+              <a:t>Customization</a:t>
+            </a:r>
+          </a:p>
+          <a:p>
+            <a:pPr lvl="1"/>
+            <a:endParaRPr lang="en-US" dirty="0" smtClean="0"/>
+          </a:p>
+          <a:p>
+            <a:pPr lvl="1"/>
+            <a:endParaRPr lang="en-US" dirty="0" smtClean="0"/>
+          </a:p>
+          <a:p>
+            <a:pPr lvl="1"/>
+            <a:endParaRPr lang="en-US" dirty="0" smtClean="0"/>
           </a:p>
         </p:txBody>
       </p:sp>
@@ -3819,7 +4741,7 @@
           <p:cNvPr id="2" name="Title 1">
             <a:extLst>
               <a:ext uri="{FF2B5EF4-FFF2-40B4-BE49-F238E27FC236}">
-                <a16:creationId xmlns:a16="http://schemas.microsoft.com/office/drawing/2014/main" id="{E40DE2C7-6055-9A45-916E-87B3B19860AB}"/>
+                <a16:creationId xmlns:a16="http://schemas.microsoft.com/office/drawing/2014/main" xmlns="" id="{E40DE2C7-6055-9A45-916E-87B3B19860AB}"/>
               </a:ext>
             </a:extLst>
           </p:cNvPr>
@@ -3853,7 +4775,7 @@
           <p:cNvPr id="3" name="Content Placeholder 2">
             <a:extLst>
               <a:ext uri="{FF2B5EF4-FFF2-40B4-BE49-F238E27FC236}">
-                <a16:creationId xmlns:a16="http://schemas.microsoft.com/office/drawing/2014/main" id="{26EE4ED4-D972-C145-A417-CACCB24BD07F}"/>
+                <a16:creationId xmlns:a16="http://schemas.microsoft.com/office/drawing/2014/main" xmlns="" id="{26EE4ED4-D972-C145-A417-CACCB24BD07F}"/>
               </a:ext>
             </a:extLst>
           </p:cNvPr>
@@ -3864,10 +4786,47 @@
             <p:ph idx="1"/>
           </p:nvPr>
         </p:nvSpPr>
-        <p:spPr/>
+        <p:spPr>
+          <a:xfrm>
+            <a:off x="838200" y="1825625"/>
+            <a:ext cx="8004142" cy="4351338"/>
+          </a:xfrm>
+        </p:spPr>
         <p:txBody>
           <a:bodyPr/>
           <a:lstStyle/>
+          <a:p>
+            <a:r>
+              <a:rPr lang="en-US" dirty="0" smtClean="0"/>
+              <a:t>Limitations:</a:t>
+            </a:r>
+          </a:p>
+          <a:p>
+            <a:pPr lvl="1"/>
+            <a:r>
+              <a:rPr lang="en-US" dirty="0" smtClean="0"/>
+              <a:t>Resources</a:t>
+            </a:r>
+          </a:p>
+          <a:p>
+            <a:pPr lvl="1"/>
+            <a:r>
+              <a:rPr lang="en-US" dirty="0" smtClean="0"/>
+              <a:t>Priorities</a:t>
+            </a:r>
+          </a:p>
+          <a:p>
+            <a:pPr lvl="1"/>
+            <a:r>
+              <a:rPr lang="en-US" dirty="0" smtClean="0"/>
+              <a:t>Adaptation</a:t>
+            </a:r>
+            <a:endParaRPr lang="en-US" dirty="0" smtClean="0"/>
+          </a:p>
+          <a:p>
+            <a:pPr lvl="1"/>
+            <a:endParaRPr lang="en-US" dirty="0" smtClean="0"/>
+          </a:p>
           <a:p>
             <a:endParaRPr lang="en-US" dirty="0"/>
           </a:p>
@@ -3908,7 +4867,7 @@
           <p:cNvPr id="2" name="Title 1">
             <a:extLst>
               <a:ext uri="{FF2B5EF4-FFF2-40B4-BE49-F238E27FC236}">
-                <a16:creationId xmlns:a16="http://schemas.microsoft.com/office/drawing/2014/main" id="{D6643F67-ADC2-CF44-A379-3EC0A9329A42}"/>
+                <a16:creationId xmlns:a16="http://schemas.microsoft.com/office/drawing/2014/main" xmlns="" id="{D6643F67-ADC2-CF44-A379-3EC0A9329A42}"/>
               </a:ext>
             </a:extLst>
           </p:cNvPr>
@@ -3935,6 +4894,81 @@
               <a:rPr lang="en-US" dirty="0"/>
               <a:t> </a:t>
             </a:r>
+          </a:p>
+        </p:txBody>
+      </p:sp>
+      <p:sp>
+        <p:nvSpPr>
+          <p:cNvPr id="3" name="Content Placeholder 2">
+            <a:extLst>
+              <a:ext uri="{FF2B5EF4-FFF2-40B4-BE49-F238E27FC236}">
+                <a16:creationId xmlns:a16="http://schemas.microsoft.com/office/drawing/2014/main" xmlns="" id="{01568967-352F-C544-9C71-95BDE616181A}"/>
+              </a:ext>
+            </a:extLst>
+          </p:cNvPr>
+          <p:cNvSpPr>
+            <a:spLocks noGrp="1"/>
+          </p:cNvSpPr>
+          <p:nvPr>
+            <p:ph idx="1"/>
+          </p:nvPr>
+        </p:nvSpPr>
+        <p:spPr>
+          <a:xfrm>
+            <a:off x="838200" y="1825625"/>
+            <a:ext cx="10515600" cy="4838786"/>
+          </a:xfrm>
+        </p:spPr>
+        <p:txBody>
+          <a:bodyPr>
+            <a:normAutofit/>
+          </a:bodyPr>
+          <a:lstStyle/>
+          <a:p>
+            <a:pPr marL="0" indent="0">
+              <a:buNone/>
+            </a:pPr>
+            <a:endParaRPr lang="en-US" dirty="0" smtClean="0"/>
+          </a:p>
+          <a:p>
+            <a:pPr lvl="1"/>
+            <a:r>
+              <a:rPr lang="en-US" dirty="0" smtClean="0"/>
+              <a:t>A possible solution, not the ultimate solution</a:t>
+            </a:r>
+          </a:p>
+          <a:p>
+            <a:pPr lvl="1"/>
+            <a:r>
+              <a:rPr lang="en-US" dirty="0" smtClean="0"/>
+              <a:t>Early stage of development</a:t>
+            </a:r>
+          </a:p>
+          <a:p>
+            <a:pPr lvl="1"/>
+            <a:r>
+              <a:rPr lang="en-US" dirty="0" smtClean="0"/>
+              <a:t>Opportunity</a:t>
+            </a:r>
+          </a:p>
+          <a:p>
+            <a:pPr lvl="1"/>
+            <a:r>
+              <a:rPr lang="en-US" dirty="0" smtClean="0"/>
+              <a:t>Caters to all</a:t>
+            </a:r>
+          </a:p>
+          <a:p>
+            <a:pPr lvl="1"/>
+            <a:endParaRPr lang="en-US" dirty="0" smtClean="0"/>
+          </a:p>
+          <a:p>
+            <a:pPr lvl="1"/>
+            <a:endParaRPr lang="en-US" dirty="0" smtClean="0"/>
+          </a:p>
+          <a:p>
+            <a:pPr lvl="1"/>
+            <a:endParaRPr lang="en-US" dirty="0" smtClean="0"/>
           </a:p>
         </p:txBody>
       </p:sp>
@@ -3973,7 +5007,7 @@
           <p:cNvPr id="2" name="Title 1">
             <a:extLst>
               <a:ext uri="{FF2B5EF4-FFF2-40B4-BE49-F238E27FC236}">
-                <a16:creationId xmlns:a16="http://schemas.microsoft.com/office/drawing/2014/main" id="{0858E4F2-C45D-7042-8240-1EBE5BA16BFC}"/>
+                <a16:creationId xmlns:a16="http://schemas.microsoft.com/office/drawing/2014/main" xmlns="" id="{0858E4F2-C45D-7042-8240-1EBE5BA16BFC}"/>
               </a:ext>
             </a:extLst>
           </p:cNvPr>
@@ -4006,7 +5040,7 @@
           <p:cNvPr id="3" name="Content Placeholder 2">
             <a:extLst>
               <a:ext uri="{FF2B5EF4-FFF2-40B4-BE49-F238E27FC236}">
-                <a16:creationId xmlns:a16="http://schemas.microsoft.com/office/drawing/2014/main" id="{9C61A06B-CFA4-1F40-B2FF-A216D0ED29AB}"/>
+                <a16:creationId xmlns:a16="http://schemas.microsoft.com/office/drawing/2014/main" xmlns="" id="{9C61A06B-CFA4-1F40-B2FF-A216D0ED29AB}"/>
               </a:ext>
             </a:extLst>
           </p:cNvPr>
@@ -4061,7 +5095,7 @@
           <p:cNvPr id="5" name="TextBox 4">
             <a:extLst>
               <a:ext uri="{FF2B5EF4-FFF2-40B4-BE49-F238E27FC236}">
-                <a16:creationId xmlns:a16="http://schemas.microsoft.com/office/drawing/2014/main" id="{7ED67492-BD7E-804F-941B-D0B8380F90E2}"/>
+                <a16:creationId xmlns:a16="http://schemas.microsoft.com/office/drawing/2014/main" xmlns="" id="{7ED67492-BD7E-804F-941B-D0B8380F90E2}"/>
               </a:ext>
             </a:extLst>
           </p:cNvPr>
@@ -4205,7 +5239,7 @@
           <p:cNvPr id="7" name="TextBox 6">
             <a:extLst>
               <a:ext uri="{FF2B5EF4-FFF2-40B4-BE49-F238E27FC236}">
-                <a16:creationId xmlns:a16="http://schemas.microsoft.com/office/drawing/2014/main" id="{91E642CA-64E5-9F4A-BC24-DCF88A550BC3}"/>
+                <a16:creationId xmlns:a16="http://schemas.microsoft.com/office/drawing/2014/main" xmlns="" id="{91E642CA-64E5-9F4A-BC24-DCF88A550BC3}"/>
               </a:ext>
             </a:extLst>
           </p:cNvPr>
@@ -4351,7 +5385,7 @@
           <p:cNvPr id="2" name="Title 1">
             <a:extLst>
               <a:ext uri="{FF2B5EF4-FFF2-40B4-BE49-F238E27FC236}">
-                <a16:creationId xmlns:a16="http://schemas.microsoft.com/office/drawing/2014/main" id="{8C422416-8AE3-1D45-B1E0-52DAFF9927B2}"/>
+                <a16:creationId xmlns:a16="http://schemas.microsoft.com/office/drawing/2014/main" xmlns="" id="{8C422416-8AE3-1D45-B1E0-52DAFF9927B2}"/>
               </a:ext>
             </a:extLst>
           </p:cNvPr>
@@ -4386,7 +5420,7 @@
           <p:cNvPr id="4" name="TextBox 3">
             <a:extLst>
               <a:ext uri="{FF2B5EF4-FFF2-40B4-BE49-F238E27FC236}">
-                <a16:creationId xmlns:a16="http://schemas.microsoft.com/office/drawing/2014/main" id="{5EBB1CD5-F9A4-AA48-8098-0F1F7AA3B991}"/>
+                <a16:creationId xmlns:a16="http://schemas.microsoft.com/office/drawing/2014/main" xmlns="" id="{5EBB1CD5-F9A4-AA48-8098-0F1F7AA3B991}"/>
               </a:ext>
             </a:extLst>
           </p:cNvPr>
@@ -4899,7 +5933,7 @@
           <p:cNvPr id="2" name="Title 1">
             <a:extLst>
               <a:ext uri="{FF2B5EF4-FFF2-40B4-BE49-F238E27FC236}">
-                <a16:creationId xmlns:a16="http://schemas.microsoft.com/office/drawing/2014/main" id="{BBBBE512-AF2D-F44A-9991-D31744A36BD7}"/>
+                <a16:creationId xmlns:a16="http://schemas.microsoft.com/office/drawing/2014/main" xmlns="" id="{BBBBE512-AF2D-F44A-9991-D31744A36BD7}"/>
               </a:ext>
             </a:extLst>
           </p:cNvPr>
@@ -4934,7 +5968,7 @@
           <p:cNvPr id="3" name="Content Placeholder 2">
             <a:extLst>
               <a:ext uri="{FF2B5EF4-FFF2-40B4-BE49-F238E27FC236}">
-                <a16:creationId xmlns:a16="http://schemas.microsoft.com/office/drawing/2014/main" id="{EFB0A784-85F6-784E-961A-EB08D9526833}"/>
+                <a16:creationId xmlns:a16="http://schemas.microsoft.com/office/drawing/2014/main" xmlns="" id="{EFB0A784-85F6-784E-961A-EB08D9526833}"/>
               </a:ext>
             </a:extLst>
           </p:cNvPr>
@@ -4989,7 +6023,7 @@
           <p:cNvPr id="4" name="Content Placeholder 3">
             <a:extLst>
               <a:ext uri="{FF2B5EF4-FFF2-40B4-BE49-F238E27FC236}">
-                <a16:creationId xmlns:a16="http://schemas.microsoft.com/office/drawing/2014/main" id="{4030B592-7E52-754B-87A2-CF2FC6C9A937}"/>
+                <a16:creationId xmlns:a16="http://schemas.microsoft.com/office/drawing/2014/main" xmlns="" id="{4030B592-7E52-754B-87A2-CF2FC6C9A937}"/>
               </a:ext>
             </a:extLst>
           </p:cNvPr>
@@ -5172,7 +6206,7 @@
           <p:cNvPr id="2" name="Title 1">
             <a:extLst>
               <a:ext uri="{FF2B5EF4-FFF2-40B4-BE49-F238E27FC236}">
-                <a16:creationId xmlns:a16="http://schemas.microsoft.com/office/drawing/2014/main" id="{28D1D0BF-50EE-A949-9035-5CE7B9E47E56}"/>
+                <a16:creationId xmlns:a16="http://schemas.microsoft.com/office/drawing/2014/main" xmlns="" id="{28D1D0BF-50EE-A949-9035-5CE7B9E47E56}"/>
               </a:ext>
             </a:extLst>
           </p:cNvPr>
@@ -5205,7 +6239,7 @@
           <p:cNvPr id="4" name="TextBox 3">
             <a:extLst>
               <a:ext uri="{FF2B5EF4-FFF2-40B4-BE49-F238E27FC236}">
-                <a16:creationId xmlns:a16="http://schemas.microsoft.com/office/drawing/2014/main" id="{3E5B3E92-D066-F349-A83D-58740645C59D}"/>
+                <a16:creationId xmlns:a16="http://schemas.microsoft.com/office/drawing/2014/main" xmlns="" id="{3E5B3E92-D066-F349-A83D-58740645C59D}"/>
               </a:ext>
             </a:extLst>
           </p:cNvPr>
@@ -5306,7 +6340,7 @@
           <p:cNvPr id="5" name="TextBox 4">
             <a:extLst>
               <a:ext uri="{FF2B5EF4-FFF2-40B4-BE49-F238E27FC236}">
-                <a16:creationId xmlns:a16="http://schemas.microsoft.com/office/drawing/2014/main" id="{21BA86A2-4BEC-2E48-A3A7-B339A4073520}"/>
+                <a16:creationId xmlns:a16="http://schemas.microsoft.com/office/drawing/2014/main" xmlns="" id="{21BA86A2-4BEC-2E48-A3A7-B339A4073520}"/>
               </a:ext>
             </a:extLst>
           </p:cNvPr>
@@ -5375,7 +6409,7 @@
           <p:cNvPr id="2" name="Title 1">
             <a:extLst>
               <a:ext uri="{FF2B5EF4-FFF2-40B4-BE49-F238E27FC236}">
-                <a16:creationId xmlns:a16="http://schemas.microsoft.com/office/drawing/2014/main" id="{0FFBFF67-5002-0548-A853-2710872993A1}"/>
+                <a16:creationId xmlns:a16="http://schemas.microsoft.com/office/drawing/2014/main" xmlns="" id="{0FFBFF67-5002-0548-A853-2710872993A1}"/>
               </a:ext>
             </a:extLst>
           </p:cNvPr>
@@ -5408,7 +6442,7 @@
           <p:cNvPr id="3" name="Content Placeholder 2">
             <a:extLst>
               <a:ext uri="{FF2B5EF4-FFF2-40B4-BE49-F238E27FC236}">
-                <a16:creationId xmlns:a16="http://schemas.microsoft.com/office/drawing/2014/main" id="{FC1A483C-3D22-AD4A-BFA0-D27E6486F079}"/>
+                <a16:creationId xmlns:a16="http://schemas.microsoft.com/office/drawing/2014/main" xmlns="" id="{FC1A483C-3D22-AD4A-BFA0-D27E6486F079}"/>
               </a:ext>
             </a:extLst>
           </p:cNvPr>
@@ -5567,7 +6601,7 @@
           <p:cNvPr id="3" name="Content Placeholder 2">
             <a:extLst>
               <a:ext uri="{FF2B5EF4-FFF2-40B4-BE49-F238E27FC236}">
-                <a16:creationId xmlns:a16="http://schemas.microsoft.com/office/drawing/2014/main" id="{C446F4A2-767F-3143-87C0-2F265F76F8D9}"/>
+                <a16:creationId xmlns:a16="http://schemas.microsoft.com/office/drawing/2014/main" xmlns="" id="{C446F4A2-767F-3143-87C0-2F265F76F8D9}"/>
               </a:ext>
             </a:extLst>
           </p:cNvPr>
@@ -5628,7 +6662,7 @@
           <p:cNvPr id="4" name="Picture 3">
             <a:extLst>
               <a:ext uri="{FF2B5EF4-FFF2-40B4-BE49-F238E27FC236}">
-                <a16:creationId xmlns:a16="http://schemas.microsoft.com/office/drawing/2014/main" id="{891F934A-F99F-0C44-B007-C3444D61B6C6}"/>
+                <a16:creationId xmlns:a16="http://schemas.microsoft.com/office/drawing/2014/main" xmlns="" id="{891F934A-F99F-0C44-B007-C3444D61B6C6}"/>
               </a:ext>
             </a:extLst>
           </p:cNvPr>
@@ -5665,7 +6699,7 @@
           <p:cNvPr id="5" name="Picture 4">
             <a:extLst>
               <a:ext uri="{FF2B5EF4-FFF2-40B4-BE49-F238E27FC236}">
-                <a16:creationId xmlns:a16="http://schemas.microsoft.com/office/drawing/2014/main" id="{74E04F5A-3B79-DB48-9270-77E727617A5C}"/>
+                <a16:creationId xmlns:a16="http://schemas.microsoft.com/office/drawing/2014/main" xmlns="" id="{74E04F5A-3B79-DB48-9270-77E727617A5C}"/>
               </a:ext>
             </a:extLst>
           </p:cNvPr>
@@ -5699,7 +6733,7 @@
           <p:cNvPr id="6" name="TextBox 5">
             <a:extLst>
               <a:ext uri="{FF2B5EF4-FFF2-40B4-BE49-F238E27FC236}">
-                <a16:creationId xmlns:a16="http://schemas.microsoft.com/office/drawing/2014/main" id="{4AA5C1A2-C6D2-E14F-B01E-2750CC020EED}"/>
+                <a16:creationId xmlns:a16="http://schemas.microsoft.com/office/drawing/2014/main" xmlns="" id="{4AA5C1A2-C6D2-E14F-B01E-2750CC020EED}"/>
               </a:ext>
             </a:extLst>
           </p:cNvPr>
@@ -5734,7 +6768,7 @@
           <p:cNvPr id="7" name="TextBox 6">
             <a:extLst>
               <a:ext uri="{FF2B5EF4-FFF2-40B4-BE49-F238E27FC236}">
-                <a16:creationId xmlns:a16="http://schemas.microsoft.com/office/drawing/2014/main" id="{76EF6EB9-21DB-1D43-A5F3-35076956FCF0}"/>
+                <a16:creationId xmlns:a16="http://schemas.microsoft.com/office/drawing/2014/main" xmlns="" id="{76EF6EB9-21DB-1D43-A5F3-35076956FCF0}"/>
               </a:ext>
             </a:extLst>
           </p:cNvPr>
@@ -5799,7 +6833,7 @@
           <p:cNvPr id="3" name="Content Placeholder 2">
             <a:extLst>
               <a:ext uri="{FF2B5EF4-FFF2-40B4-BE49-F238E27FC236}">
-                <a16:creationId xmlns:a16="http://schemas.microsoft.com/office/drawing/2014/main" id="{D9F2ECA9-D1B8-964E-9E86-B144497D715B}"/>
+                <a16:creationId xmlns:a16="http://schemas.microsoft.com/office/drawing/2014/main" xmlns="" id="{D9F2ECA9-D1B8-964E-9E86-B144497D715B}"/>
               </a:ext>
             </a:extLst>
           </p:cNvPr>
@@ -5862,7 +6896,7 @@
           <p:cNvPr id="5" name="Picture 4">
             <a:extLst>
               <a:ext uri="{FF2B5EF4-FFF2-40B4-BE49-F238E27FC236}">
-                <a16:creationId xmlns:a16="http://schemas.microsoft.com/office/drawing/2014/main" id="{339CC5AE-1F17-F744-82B7-1A6395B335F9}"/>
+                <a16:creationId xmlns:a16="http://schemas.microsoft.com/office/drawing/2014/main" xmlns="" id="{339CC5AE-1F17-F744-82B7-1A6395B335F9}"/>
               </a:ext>
             </a:extLst>
           </p:cNvPr>
@@ -5899,7 +6933,7 @@
           <p:cNvPr id="6" name="TextBox 5">
             <a:extLst>
               <a:ext uri="{FF2B5EF4-FFF2-40B4-BE49-F238E27FC236}">
-                <a16:creationId xmlns:a16="http://schemas.microsoft.com/office/drawing/2014/main" id="{18D920FA-4CCE-5D47-A9C5-F459194A43DC}"/>
+                <a16:creationId xmlns:a16="http://schemas.microsoft.com/office/drawing/2014/main" xmlns="" id="{18D920FA-4CCE-5D47-A9C5-F459194A43DC}"/>
               </a:ext>
             </a:extLst>
           </p:cNvPr>
@@ -5934,7 +6968,7 @@
           <p:cNvPr id="7" name="TextBox 6">
             <a:extLst>
               <a:ext uri="{FF2B5EF4-FFF2-40B4-BE49-F238E27FC236}">
-                <a16:creationId xmlns:a16="http://schemas.microsoft.com/office/drawing/2014/main" id="{BD259763-16E6-8E44-8BFF-DB67857246C0}"/>
+                <a16:creationId xmlns:a16="http://schemas.microsoft.com/office/drawing/2014/main" xmlns="" id="{BD259763-16E6-8E44-8BFF-DB67857246C0}"/>
               </a:ext>
             </a:extLst>
           </p:cNvPr>
@@ -5969,7 +7003,7 @@
           <p:cNvPr id="2" name="TextBox 1">
             <a:extLst>
               <a:ext uri="{FF2B5EF4-FFF2-40B4-BE49-F238E27FC236}">
-                <a16:creationId xmlns:a16="http://schemas.microsoft.com/office/drawing/2014/main" id="{3961BDB7-735C-EB41-A4E2-80FFFBB3EE41}"/>
+                <a16:creationId xmlns:a16="http://schemas.microsoft.com/office/drawing/2014/main" xmlns="" id="{3961BDB7-735C-EB41-A4E2-80FFFBB3EE41}"/>
               </a:ext>
             </a:extLst>
           </p:cNvPr>
@@ -6046,7 +7080,7 @@
           <p:cNvPr id="3" name="Content Placeholder 2">
             <a:extLst>
               <a:ext uri="{FF2B5EF4-FFF2-40B4-BE49-F238E27FC236}">
-                <a16:creationId xmlns:a16="http://schemas.microsoft.com/office/drawing/2014/main" id="{F1FFF592-2F60-9F43-B039-2DB56C637E62}"/>
+                <a16:creationId xmlns:a16="http://schemas.microsoft.com/office/drawing/2014/main" xmlns="" id="{F1FFF592-2F60-9F43-B039-2DB56C637E62}"/>
               </a:ext>
             </a:extLst>
           </p:cNvPr>
@@ -6104,7 +7138,7 @@
             <a:hlinkClick r:id="" action="ppaction://media"/>
             <a:extLst>
               <a:ext uri="{FF2B5EF4-FFF2-40B4-BE49-F238E27FC236}">
-                <a16:creationId xmlns:a16="http://schemas.microsoft.com/office/drawing/2014/main" id="{B1BF3917-C10B-2347-8B4A-479D0A524E5A}"/>
+                <a16:creationId xmlns:a16="http://schemas.microsoft.com/office/drawing/2014/main" xmlns="" id="{B1BF3917-C10B-2347-8B4A-479D0A524E5A}"/>
               </a:ext>
             </a:extLst>
           </p:cNvPr>
@@ -6140,7 +7174,7 @@
           <p:cNvPr id="4" name="TextBox 3">
             <a:extLst>
               <a:ext uri="{FF2B5EF4-FFF2-40B4-BE49-F238E27FC236}">
-                <a16:creationId xmlns:a16="http://schemas.microsoft.com/office/drawing/2014/main" id="{C618E1CE-F3AE-D84B-8961-5F145D6E79B1}"/>
+                <a16:creationId xmlns:a16="http://schemas.microsoft.com/office/drawing/2014/main" xmlns="" id="{C618E1CE-F3AE-D84B-8961-5F145D6E79B1}"/>
               </a:ext>
             </a:extLst>
           </p:cNvPr>
@@ -6182,7 +7216,7 @@
           <p:cNvPr id="5" name="TextBox 4">
             <a:extLst>
               <a:ext uri="{FF2B5EF4-FFF2-40B4-BE49-F238E27FC236}">
-                <a16:creationId xmlns:a16="http://schemas.microsoft.com/office/drawing/2014/main" id="{047ECAF2-165A-3C42-B8BD-620E1FB06E68}"/>
+                <a16:creationId xmlns:a16="http://schemas.microsoft.com/office/drawing/2014/main" xmlns="" id="{047ECAF2-165A-3C42-B8BD-620E1FB06E68}"/>
               </a:ext>
             </a:extLst>
           </p:cNvPr>
@@ -6225,7 +7259,7 @@
           <p:cNvPr id="6" name="TextBox 5">
             <a:extLst>
               <a:ext uri="{FF2B5EF4-FFF2-40B4-BE49-F238E27FC236}">
-                <a16:creationId xmlns:a16="http://schemas.microsoft.com/office/drawing/2014/main" id="{46217A5A-D61B-CF4A-8267-B6703AB0DA4C}"/>
+                <a16:creationId xmlns:a16="http://schemas.microsoft.com/office/drawing/2014/main" xmlns="" id="{46217A5A-D61B-CF4A-8267-B6703AB0DA4C}"/>
               </a:ext>
             </a:extLst>
           </p:cNvPr>
@@ -6699,4 +7733,265 @@
     </a:ext>
   </a:extLst>
 </a:theme>
+</file>
+
+<file path=ppt/theme/theme2.xml><?xml version="1.0" encoding="utf-8"?>
+<a:theme xmlns:a="http://schemas.openxmlformats.org/drawingml/2006/main" name="Office Theme">
+  <a:themeElements>
+    <a:clrScheme name="Office">
+      <a:dk1>
+        <a:sysClr val="windowText" lastClr="000000"/>
+      </a:dk1>
+      <a:lt1>
+        <a:sysClr val="window" lastClr="FFFFFF"/>
+      </a:lt1>
+      <a:dk2>
+        <a:srgbClr val="44546A"/>
+      </a:dk2>
+      <a:lt2>
+        <a:srgbClr val="E7E6E6"/>
+      </a:lt2>
+      <a:accent1>
+        <a:srgbClr val="5B9BD5"/>
+      </a:accent1>
+      <a:accent2>
+        <a:srgbClr val="ED7D31"/>
+      </a:accent2>
+      <a:accent3>
+        <a:srgbClr val="A5A5A5"/>
+      </a:accent3>
+      <a:accent4>
+        <a:srgbClr val="FFC000"/>
+      </a:accent4>
+      <a:accent5>
+        <a:srgbClr val="4472C4"/>
+      </a:accent5>
+      <a:accent6>
+        <a:srgbClr val="70AD47"/>
+      </a:accent6>
+      <a:hlink>
+        <a:srgbClr val="0563C1"/>
+      </a:hlink>
+      <a:folHlink>
+        <a:srgbClr val="954F72"/>
+      </a:folHlink>
+    </a:clrScheme>
+    <a:fontScheme name="Office">
+      <a:majorFont>
+        <a:latin typeface="Calibri Light" panose="020F0302020204030204"/>
+        <a:ea typeface=""/>
+        <a:cs typeface=""/>
+        <a:font script="Jpan" typeface="ＭＳ Ｐゴシック"/>
+        <a:font script="Hang" typeface="맑은 고딕"/>
+        <a:font script="Hans" typeface="宋体"/>
+        <a:font script="Hant" typeface="新細明體"/>
+        <a:font script="Arab" typeface="Times New Roman"/>
+        <a:font script="Hebr" typeface="Times New Roman"/>
+        <a:font script="Thai" typeface="Angsana New"/>
+        <a:font script="Ethi" typeface="Nyala"/>
+        <a:font script="Beng" typeface="Vrinda"/>
+        <a:font script="Gujr" typeface="Shruti"/>
+        <a:font script="Khmr" typeface="MoolBoran"/>
+        <a:font script="Knda" typeface="Tunga"/>
+        <a:font script="Guru" typeface="Raavi"/>
+        <a:font script="Cans" typeface="Euphemia"/>
+        <a:font script="Cher" typeface="Plantagenet Cherokee"/>
+        <a:font script="Yiii" typeface="Microsoft Yi Baiti"/>
+        <a:font script="Tibt" typeface="Microsoft Himalaya"/>
+        <a:font script="Thaa" typeface="MV Boli"/>
+        <a:font script="Deva" typeface="Mangal"/>
+        <a:font script="Telu" typeface="Gautami"/>
+        <a:font script="Taml" typeface="Latha"/>
+        <a:font script="Syrc" typeface="Estrangelo Edessa"/>
+        <a:font script="Orya" typeface="Kalinga"/>
+        <a:font script="Mlym" typeface="Kartika"/>
+        <a:font script="Laoo" typeface="DokChampa"/>
+        <a:font script="Sinh" typeface="Iskoola Pota"/>
+        <a:font script="Mong" typeface="Mongolian Baiti"/>
+        <a:font script="Viet" typeface="Times New Roman"/>
+        <a:font script="Uigh" typeface="Microsoft Uighur"/>
+        <a:font script="Geor" typeface="Sylfaen"/>
+      </a:majorFont>
+      <a:minorFont>
+        <a:latin typeface="Calibri" panose="020F0502020204030204"/>
+        <a:ea typeface=""/>
+        <a:cs typeface=""/>
+        <a:font script="Jpan" typeface="ＭＳ Ｐゴシック"/>
+        <a:font script="Hang" typeface="맑은 고딕"/>
+        <a:font script="Hans" typeface="宋体"/>
+        <a:font script="Hant" typeface="新細明體"/>
+        <a:font script="Arab" typeface="Arial"/>
+        <a:font script="Hebr" typeface="Arial"/>
+        <a:font script="Thai" typeface="Cordia New"/>
+        <a:font script="Ethi" typeface="Nyala"/>
+        <a:font script="Beng" typeface="Vrinda"/>
+        <a:font script="Gujr" typeface="Shruti"/>
+        <a:font script="Khmr" typeface="DaunPenh"/>
+        <a:font script="Knda" typeface="Tunga"/>
+        <a:font script="Guru" typeface="Raavi"/>
+        <a:font script="Cans" typeface="Euphemia"/>
+        <a:font script="Cher" typeface="Plantagenet Cherokee"/>
+        <a:font script="Yiii" typeface="Microsoft Yi Baiti"/>
+        <a:font script="Tibt" typeface="Microsoft Himalaya"/>
+        <a:font script="Thaa" typeface="MV Boli"/>
+        <a:font script="Deva" typeface="Mangal"/>
+        <a:font script="Telu" typeface="Gautami"/>
+        <a:font script="Taml" typeface="Latha"/>
+        <a:font script="Syrc" typeface="Estrangelo Edessa"/>
+        <a:font script="Orya" typeface="Kalinga"/>
+        <a:font script="Mlym" typeface="Kartika"/>
+        <a:font script="Laoo" typeface="DokChampa"/>
+        <a:font script="Sinh" typeface="Iskoola Pota"/>
+        <a:font script="Mong" typeface="Mongolian Baiti"/>
+        <a:font script="Viet" typeface="Arial"/>
+        <a:font script="Uigh" typeface="Microsoft Uighur"/>
+        <a:font script="Geor" typeface="Sylfaen"/>
+      </a:minorFont>
+    </a:fontScheme>
+    <a:fmtScheme name="Office">
+      <a:fillStyleLst>
+        <a:solidFill>
+          <a:schemeClr val="phClr"/>
+        </a:solidFill>
+        <a:gradFill rotWithShape="1">
+          <a:gsLst>
+            <a:gs pos="0">
+              <a:schemeClr val="phClr">
+                <a:lumMod val="110000"/>
+                <a:satMod val="105000"/>
+                <a:tint val="67000"/>
+              </a:schemeClr>
+            </a:gs>
+            <a:gs pos="50000">
+              <a:schemeClr val="phClr">
+                <a:lumMod val="105000"/>
+                <a:satMod val="103000"/>
+                <a:tint val="73000"/>
+              </a:schemeClr>
+            </a:gs>
+            <a:gs pos="100000">
+              <a:schemeClr val="phClr">
+                <a:lumMod val="105000"/>
+                <a:satMod val="109000"/>
+                <a:tint val="81000"/>
+              </a:schemeClr>
+            </a:gs>
+          </a:gsLst>
+          <a:lin ang="5400000" scaled="0"/>
+        </a:gradFill>
+        <a:gradFill rotWithShape="1">
+          <a:gsLst>
+            <a:gs pos="0">
+              <a:schemeClr val="phClr">
+                <a:satMod val="103000"/>
+                <a:lumMod val="102000"/>
+                <a:tint val="94000"/>
+              </a:schemeClr>
+            </a:gs>
+            <a:gs pos="50000">
+              <a:schemeClr val="phClr">
+                <a:satMod val="110000"/>
+                <a:lumMod val="100000"/>
+                <a:shade val="100000"/>
+              </a:schemeClr>
+            </a:gs>
+            <a:gs pos="100000">
+              <a:schemeClr val="phClr">
+                <a:lumMod val="99000"/>
+                <a:satMod val="120000"/>
+                <a:shade val="78000"/>
+              </a:schemeClr>
+            </a:gs>
+          </a:gsLst>
+          <a:lin ang="5400000" scaled="0"/>
+        </a:gradFill>
+      </a:fillStyleLst>
+      <a:lnStyleLst>
+        <a:ln w="6350" cap="flat" cmpd="sng" algn="ctr">
+          <a:solidFill>
+            <a:schemeClr val="phClr"/>
+          </a:solidFill>
+          <a:prstDash val="solid"/>
+          <a:miter lim="800000"/>
+        </a:ln>
+        <a:ln w="12700" cap="flat" cmpd="sng" algn="ctr">
+          <a:solidFill>
+            <a:schemeClr val="phClr"/>
+          </a:solidFill>
+          <a:prstDash val="solid"/>
+          <a:miter lim="800000"/>
+        </a:ln>
+        <a:ln w="19050" cap="flat" cmpd="sng" algn="ctr">
+          <a:solidFill>
+            <a:schemeClr val="phClr"/>
+          </a:solidFill>
+          <a:prstDash val="solid"/>
+          <a:miter lim="800000"/>
+        </a:ln>
+      </a:lnStyleLst>
+      <a:effectStyleLst>
+        <a:effectStyle>
+          <a:effectLst/>
+        </a:effectStyle>
+        <a:effectStyle>
+          <a:effectLst/>
+        </a:effectStyle>
+        <a:effectStyle>
+          <a:effectLst>
+            <a:outerShdw blurRad="57150" dist="19050" dir="5400000" algn="ctr" rotWithShape="0">
+              <a:srgbClr val="000000">
+                <a:alpha val="63000"/>
+              </a:srgbClr>
+            </a:outerShdw>
+          </a:effectLst>
+        </a:effectStyle>
+      </a:effectStyleLst>
+      <a:bgFillStyleLst>
+        <a:solidFill>
+          <a:schemeClr val="phClr"/>
+        </a:solidFill>
+        <a:solidFill>
+          <a:schemeClr val="phClr">
+            <a:tint val="95000"/>
+            <a:satMod val="170000"/>
+          </a:schemeClr>
+        </a:solidFill>
+        <a:gradFill rotWithShape="1">
+          <a:gsLst>
+            <a:gs pos="0">
+              <a:schemeClr val="phClr">
+                <a:tint val="93000"/>
+                <a:satMod val="150000"/>
+                <a:shade val="98000"/>
+                <a:lumMod val="102000"/>
+              </a:schemeClr>
+            </a:gs>
+            <a:gs pos="50000">
+              <a:schemeClr val="phClr">
+                <a:tint val="98000"/>
+                <a:satMod val="130000"/>
+                <a:shade val="90000"/>
+                <a:lumMod val="103000"/>
+              </a:schemeClr>
+            </a:gs>
+            <a:gs pos="100000">
+              <a:schemeClr val="phClr">
+                <a:shade val="63000"/>
+                <a:satMod val="120000"/>
+              </a:schemeClr>
+            </a:gs>
+          </a:gsLst>
+          <a:lin ang="5400000" scaled="0"/>
+        </a:gradFill>
+      </a:bgFillStyleLst>
+    </a:fmtScheme>
+  </a:themeElements>
+  <a:objectDefaults/>
+  <a:extraClrSchemeLst/>
+  <a:extLst>
+    <a:ext uri="{05A4C25C-085E-4340-85A3-A5531E510DB2}">
+      <thm15:themeFamily xmlns:thm15="http://schemas.microsoft.com/office/thememl/2012/main" name="Office Theme" id="{62F939B6-93AF-4DB8-9C6B-D6C7DFDC589F}" vid="{4A3C46E8-61CC-4603-A589-7422A47A8E4A}"/>
+    </a:ext>
+  </a:extLst>
+</a:theme>
 </file>
</xml_diff>